<commit_message>
Collect used code to ./old and update architecture image
</commit_message>
<xml_diff>
--- a/architecture.pptx
+++ b/architecture.pptx
@@ -6,7 +6,6 @@
   </p:sldMasterIdLst>
   <p:sldIdLst>
     <p:sldId id="256" r:id="rId2"/>
-    <p:sldId id="257" r:id="rId3"/>
   </p:sldIdLst>
   <p:sldSz cx="12192000" cy="6858000"/>
   <p:notesSz cx="6858000" cy="9144000"/>
@@ -262,7 +261,7 @@
           <a:p>
             <a:fld id="{A240B9EE-CE20-479F-91C5-799A9E0E68A8}" type="datetimeFigureOut">
               <a:rPr lang="LID4096" smtClean="0"/>
-              <a:t>05/26/2020</a:t>
+              <a:t>02/11/2021</a:t>
             </a:fld>
             <a:endParaRPr lang="LID4096"/>
           </a:p>
@@ -462,7 +461,7 @@
           <a:p>
             <a:fld id="{A240B9EE-CE20-479F-91C5-799A9E0E68A8}" type="datetimeFigureOut">
               <a:rPr lang="LID4096" smtClean="0"/>
-              <a:t>05/26/2020</a:t>
+              <a:t>02/11/2021</a:t>
             </a:fld>
             <a:endParaRPr lang="LID4096"/>
           </a:p>
@@ -672,7 +671,7 @@
           <a:p>
             <a:fld id="{A240B9EE-CE20-479F-91C5-799A9E0E68A8}" type="datetimeFigureOut">
               <a:rPr lang="LID4096" smtClean="0"/>
-              <a:t>05/26/2020</a:t>
+              <a:t>02/11/2021</a:t>
             </a:fld>
             <a:endParaRPr lang="LID4096"/>
           </a:p>
@@ -872,7 +871,7 @@
           <a:p>
             <a:fld id="{A240B9EE-CE20-479F-91C5-799A9E0E68A8}" type="datetimeFigureOut">
               <a:rPr lang="LID4096" smtClean="0"/>
-              <a:t>05/26/2020</a:t>
+              <a:t>02/11/2021</a:t>
             </a:fld>
             <a:endParaRPr lang="LID4096"/>
           </a:p>
@@ -1148,7 +1147,7 @@
           <a:p>
             <a:fld id="{A240B9EE-CE20-479F-91C5-799A9E0E68A8}" type="datetimeFigureOut">
               <a:rPr lang="LID4096" smtClean="0"/>
-              <a:t>05/26/2020</a:t>
+              <a:t>02/11/2021</a:t>
             </a:fld>
             <a:endParaRPr lang="LID4096"/>
           </a:p>
@@ -1416,7 +1415,7 @@
           <a:p>
             <a:fld id="{A240B9EE-CE20-479F-91C5-799A9E0E68A8}" type="datetimeFigureOut">
               <a:rPr lang="LID4096" smtClean="0"/>
-              <a:t>05/26/2020</a:t>
+              <a:t>02/11/2021</a:t>
             </a:fld>
             <a:endParaRPr lang="LID4096"/>
           </a:p>
@@ -1831,7 +1830,7 @@
           <a:p>
             <a:fld id="{A240B9EE-CE20-479F-91C5-799A9E0E68A8}" type="datetimeFigureOut">
               <a:rPr lang="LID4096" smtClean="0"/>
-              <a:t>05/26/2020</a:t>
+              <a:t>02/11/2021</a:t>
             </a:fld>
             <a:endParaRPr lang="LID4096"/>
           </a:p>
@@ -1973,7 +1972,7 @@
           <a:p>
             <a:fld id="{A240B9EE-CE20-479F-91C5-799A9E0E68A8}" type="datetimeFigureOut">
               <a:rPr lang="LID4096" smtClean="0"/>
-              <a:t>05/26/2020</a:t>
+              <a:t>02/11/2021</a:t>
             </a:fld>
             <a:endParaRPr lang="LID4096"/>
           </a:p>
@@ -2086,7 +2085,7 @@
           <a:p>
             <a:fld id="{A240B9EE-CE20-479F-91C5-799A9E0E68A8}" type="datetimeFigureOut">
               <a:rPr lang="LID4096" smtClean="0"/>
-              <a:t>05/26/2020</a:t>
+              <a:t>02/11/2021</a:t>
             </a:fld>
             <a:endParaRPr lang="LID4096"/>
           </a:p>
@@ -2399,7 +2398,7 @@
           <a:p>
             <a:fld id="{A240B9EE-CE20-479F-91C5-799A9E0E68A8}" type="datetimeFigureOut">
               <a:rPr lang="LID4096" smtClean="0"/>
-              <a:t>05/26/2020</a:t>
+              <a:t>02/11/2021</a:t>
             </a:fld>
             <a:endParaRPr lang="LID4096"/>
           </a:p>
@@ -2688,7 +2687,7 @@
           <a:p>
             <a:fld id="{A240B9EE-CE20-479F-91C5-799A9E0E68A8}" type="datetimeFigureOut">
               <a:rPr lang="LID4096" smtClean="0"/>
-              <a:t>05/26/2020</a:t>
+              <a:t>02/11/2021</a:t>
             </a:fld>
             <a:endParaRPr lang="LID4096"/>
           </a:p>
@@ -2931,7 +2930,7 @@
           <a:p>
             <a:fld id="{A240B9EE-CE20-479F-91C5-799A9E0E68A8}" type="datetimeFigureOut">
               <a:rPr lang="LID4096" smtClean="0"/>
-              <a:t>05/26/2020</a:t>
+              <a:t>02/11/2021</a:t>
             </a:fld>
             <a:endParaRPr lang="LID4096"/>
           </a:p>
@@ -3350,10 +3349,10 @@
       </p:grpSpPr>
       <p:sp>
         <p:nvSpPr>
-          <p:cNvPr id="4" name="Rectangle: Rounded Corners 3">
-            <a:extLst>
-              <a:ext uri="{FF2B5EF4-FFF2-40B4-BE49-F238E27FC236}">
-                <a16:creationId xmlns:a16="http://schemas.microsoft.com/office/drawing/2014/main" id="{7B2442C7-12A0-4C94-92C4-54ACFA3C2FA6}"/>
+          <p:cNvPr id="5" name="Rectangle: Rounded Corners 4">
+            <a:extLst>
+              <a:ext uri="{FF2B5EF4-FFF2-40B4-BE49-F238E27FC236}">
+                <a16:creationId xmlns:a16="http://schemas.microsoft.com/office/drawing/2014/main" id="{2778DD4B-7A59-432F-918E-2DB8A6D67DAB}"/>
               </a:ext>
             </a:extLst>
           </p:cNvPr>
@@ -3362,8 +3361,8 @@
         </p:nvSpPr>
         <p:spPr>
           <a:xfrm>
-            <a:off x="842917" y="1942355"/>
-            <a:ext cx="2540791" cy="1327756"/>
+            <a:off x="6088872" y="1361276"/>
+            <a:ext cx="5635300" cy="2486439"/>
           </a:xfrm>
           <a:prstGeom prst="roundRect">
             <a:avLst/>
@@ -3392,7 +3391,12 @@
           </a:fontRef>
         </p:style>
         <p:txBody>
-          <a:bodyPr rtlCol="0" anchor="ctr"/>
+          <a:bodyPr rot="0" spcFirstLastPara="0" vertOverflow="overflow" horzOverflow="overflow" vert="horz" wrap="square" lIns="91440" tIns="45720" rIns="91440" bIns="45720" numCol="1" spcCol="0" rtlCol="0" fromWordArt="0" anchor="ctr" anchorCtr="0" forceAA="0" compatLnSpc="1">
+            <a:prstTxWarp prst="textNoShape">
+              <a:avLst/>
+            </a:prstTxWarp>
+            <a:noAutofit/>
+          </a:bodyPr>
           <a:lstStyle/>
           <a:p>
             <a:pPr algn="ctr"/>
@@ -3402,10 +3406,10 @@
       </p:sp>
       <p:sp>
         <p:nvSpPr>
-          <p:cNvPr id="5" name="Rectangle: Rounded Corners 4">
-            <a:extLst>
-              <a:ext uri="{FF2B5EF4-FFF2-40B4-BE49-F238E27FC236}">
-                <a16:creationId xmlns:a16="http://schemas.microsoft.com/office/drawing/2014/main" id="{2778DD4B-7A59-432F-918E-2DB8A6D67DAB}"/>
+          <p:cNvPr id="8" name="Rectangle 7">
+            <a:extLst>
+              <a:ext uri="{FF2B5EF4-FFF2-40B4-BE49-F238E27FC236}">
+                <a16:creationId xmlns:a16="http://schemas.microsoft.com/office/drawing/2014/main" id="{B34E4689-3DD5-4327-A66B-7FF90A1098B1}"/>
               </a:ext>
             </a:extLst>
           </p:cNvPr>
@@ -3414,18 +3418,12 @@
         </p:nvSpPr>
         <p:spPr>
           <a:xfrm>
-            <a:off x="6088872" y="1361276"/>
-            <a:ext cx="5635300" cy="2486439"/>
-          </a:xfrm>
-          <a:prstGeom prst="roundRect">
+            <a:off x="6524074" y="4739647"/>
+            <a:ext cx="963509" cy="1155591"/>
+          </a:xfrm>
+          <a:prstGeom prst="rect">
             <a:avLst/>
           </a:prstGeom>
-          <a:solidFill>
-            <a:schemeClr val="accent1">
-              <a:lumMod val="40000"/>
-              <a:lumOff val="60000"/>
-            </a:schemeClr>
-          </a:solidFill>
         </p:spPr>
         <p:style>
           <a:lnRef idx="2">
@@ -3444,90 +3442,38 @@
           </a:fontRef>
         </p:style>
         <p:txBody>
-          <a:bodyPr rot="0" spcFirstLastPara="0" vertOverflow="overflow" horzOverflow="overflow" vert="horz" wrap="square" lIns="91440" tIns="45720" rIns="91440" bIns="45720" numCol="1" spcCol="0" rtlCol="0" fromWordArt="0" anchor="ctr" anchorCtr="0" forceAA="0" compatLnSpc="1">
-            <a:prstTxWarp prst="textNoShape">
-              <a:avLst/>
-            </a:prstTxWarp>
-            <a:noAutofit/>
-          </a:bodyPr>
+          <a:bodyPr rtlCol="0" anchor="ctr"/>
           <a:lstStyle/>
           <a:p>
             <a:pPr algn="ctr"/>
-            <a:endParaRPr lang="LID4096"/>
-          </a:p>
-        </p:txBody>
-      </p:sp>
-      <p:sp>
-        <p:nvSpPr>
-          <p:cNvPr id="6" name="TextBox 5">
-            <a:extLst>
-              <a:ext uri="{FF2B5EF4-FFF2-40B4-BE49-F238E27FC236}">
-                <a16:creationId xmlns:a16="http://schemas.microsoft.com/office/drawing/2014/main" id="{DA134272-E2D7-4D71-B7C5-E0F714C7205E}"/>
-              </a:ext>
-            </a:extLst>
-          </p:cNvPr>
-          <p:cNvSpPr txBox="1"/>
+            <a:r>
+              <a:rPr lang="en-US" sz="1200" dirty="0"/>
+              <a:t>Blue LED -&gt; indicate cooling is on</a:t>
+            </a:r>
+            <a:endParaRPr lang="LID4096" sz="1200" dirty="0"/>
+          </a:p>
+        </p:txBody>
+      </p:sp>
+      <p:sp>
+        <p:nvSpPr>
+          <p:cNvPr id="9" name="Rectangle 8">
+            <a:extLst>
+              <a:ext uri="{FF2B5EF4-FFF2-40B4-BE49-F238E27FC236}">
+                <a16:creationId xmlns:a16="http://schemas.microsoft.com/office/drawing/2014/main" id="{5E370936-32D0-4351-8F3C-D2150890B089}"/>
+              </a:ext>
+            </a:extLst>
+          </p:cNvPr>
+          <p:cNvSpPr/>
           <p:nvPr/>
         </p:nvSpPr>
         <p:spPr>
           <a:xfrm>
-            <a:off x="1645844" y="1960067"/>
-            <a:ext cx="934936" cy="369332"/>
+            <a:off x="5500698" y="4745132"/>
+            <a:ext cx="963509" cy="1145064"/>
           </a:xfrm>
           <a:prstGeom prst="rect">
             <a:avLst/>
           </a:prstGeom>
-          <a:noFill/>
-        </p:spPr>
-        <p:txBody>
-          <a:bodyPr wrap="none" rtlCol="0">
-            <a:spAutoFit/>
-          </a:bodyPr>
-          <a:lstStyle/>
-          <a:p>
-            <a:pPr algn="ctr"/>
-            <a:r>
-              <a:rPr lang="en-US" dirty="0">
-                <a:solidFill>
-                  <a:schemeClr val="bg1"/>
-                </a:solidFill>
-              </a:rPr>
-              <a:t>Arduino</a:t>
-            </a:r>
-            <a:endParaRPr lang="LID4096" dirty="0">
-              <a:solidFill>
-                <a:schemeClr val="bg1"/>
-              </a:solidFill>
-            </a:endParaRPr>
-          </a:p>
-        </p:txBody>
-      </p:sp>
-      <p:sp>
-        <p:nvSpPr>
-          <p:cNvPr id="7" name="Rectangle 6">
-            <a:extLst>
-              <a:ext uri="{FF2B5EF4-FFF2-40B4-BE49-F238E27FC236}">
-                <a16:creationId xmlns:a16="http://schemas.microsoft.com/office/drawing/2014/main" id="{A8F5A97E-0982-44BE-BF18-4801237FFFF7}"/>
-              </a:ext>
-            </a:extLst>
-          </p:cNvPr>
-          <p:cNvSpPr/>
-          <p:nvPr/>
-        </p:nvSpPr>
-        <p:spPr>
-          <a:xfrm>
-            <a:off x="1200892" y="2329583"/>
-            <a:ext cx="1822384" cy="552316"/>
-          </a:xfrm>
-          <a:prstGeom prst="rect">
-            <a:avLst/>
-          </a:prstGeom>
-          <a:solidFill>
-            <a:schemeClr val="accent1">
-              <a:lumMod val="20000"/>
-              <a:lumOff val="80000"/>
-            </a:schemeClr>
-          </a:solidFill>
         </p:spPr>
         <p:style>
           <a:lnRef idx="2">
@@ -3551,33 +3497,19 @@
           <a:p>
             <a:pPr algn="ctr"/>
             <a:r>
-              <a:rPr lang="fi-FI" sz="1400" dirty="0" err="1">
-                <a:solidFill>
-                  <a:schemeClr val="tx1">
-                    <a:lumMod val="50000"/>
-                    <a:lumOff val="50000"/>
-                  </a:schemeClr>
-                </a:solidFill>
-              </a:rPr>
-              <a:t>sketch_temp_relay.ino</a:t>
-            </a:r>
-            <a:endParaRPr lang="LID4096" sz="1400" dirty="0">
-              <a:solidFill>
-                <a:schemeClr val="tx1">
-                  <a:lumMod val="50000"/>
-                  <a:lumOff val="50000"/>
-                </a:schemeClr>
-              </a:solidFill>
-            </a:endParaRPr>
-          </a:p>
-        </p:txBody>
-      </p:sp>
-      <p:sp>
-        <p:nvSpPr>
-          <p:cNvPr id="8" name="Rectangle 7">
-            <a:extLst>
-              <a:ext uri="{FF2B5EF4-FFF2-40B4-BE49-F238E27FC236}">
-                <a16:creationId xmlns:a16="http://schemas.microsoft.com/office/drawing/2014/main" id="{B34E4689-3DD5-4327-A66B-7FF90A1098B1}"/>
+              <a:rPr lang="en-US" sz="1200" dirty="0"/>
+              <a:t>Red LED  -&gt; indicate heat is on</a:t>
+            </a:r>
+            <a:endParaRPr lang="LID4096" sz="1200" dirty="0"/>
+          </a:p>
+        </p:txBody>
+      </p:sp>
+      <p:sp>
+        <p:nvSpPr>
+          <p:cNvPr id="10" name="Rectangle 9">
+            <a:extLst>
+              <a:ext uri="{FF2B5EF4-FFF2-40B4-BE49-F238E27FC236}">
+                <a16:creationId xmlns:a16="http://schemas.microsoft.com/office/drawing/2014/main" id="{F5799364-C1C5-4D1E-8D26-18A86A1FC2C8}"/>
               </a:ext>
             </a:extLst>
           </p:cNvPr>
@@ -3586,8 +3518,8 @@
         </p:nvSpPr>
         <p:spPr>
           <a:xfrm>
-            <a:off x="6524074" y="4739647"/>
-            <a:ext cx="963509" cy="1155591"/>
+            <a:off x="4477320" y="4739649"/>
+            <a:ext cx="963509" cy="1150326"/>
           </a:xfrm>
           <a:prstGeom prst="rect">
             <a:avLst/>
@@ -3616,7 +3548,7 @@
             <a:pPr algn="ctr"/>
             <a:r>
               <a:rPr lang="en-US" sz="1200" dirty="0"/>
-              <a:t>Blue LED -&gt; indicate cooling is on</a:t>
+              <a:t>Relay -&gt; control fridge power</a:t>
             </a:r>
             <a:endParaRPr lang="LID4096" sz="1200" dirty="0"/>
           </a:p>
@@ -3624,10 +3556,10 @@
       </p:sp>
       <p:sp>
         <p:nvSpPr>
-          <p:cNvPr id="9" name="Rectangle 8">
-            <a:extLst>
-              <a:ext uri="{FF2B5EF4-FFF2-40B4-BE49-F238E27FC236}">
-                <a16:creationId xmlns:a16="http://schemas.microsoft.com/office/drawing/2014/main" id="{5E370936-32D0-4351-8F3C-D2150890B089}"/>
+          <p:cNvPr id="11" name="Rectangle 10">
+            <a:extLst>
+              <a:ext uri="{FF2B5EF4-FFF2-40B4-BE49-F238E27FC236}">
+                <a16:creationId xmlns:a16="http://schemas.microsoft.com/office/drawing/2014/main" id="{1EA37D1F-2C12-4B6E-935C-27196AA5B799}"/>
               </a:ext>
             </a:extLst>
           </p:cNvPr>
@@ -3636,8 +3568,8 @@
         </p:nvSpPr>
         <p:spPr>
           <a:xfrm>
-            <a:off x="5500698" y="4745132"/>
-            <a:ext cx="963509" cy="1145064"/>
+            <a:off x="3453942" y="4745132"/>
+            <a:ext cx="963509" cy="1150327"/>
           </a:xfrm>
           <a:prstGeom prst="rect">
             <a:avLst/>
@@ -3666,18 +3598,22 @@
             <a:pPr algn="ctr"/>
             <a:r>
               <a:rPr lang="en-US" sz="1200" dirty="0"/>
-              <a:t>Red LED  -&gt; indicate heat is on</a:t>
+              <a:t>Relay -&gt; control heating pad</a:t>
             </a:r>
             <a:endParaRPr lang="LID4096" sz="1200" dirty="0"/>
           </a:p>
-        </p:txBody>
-      </p:sp>
-      <p:sp>
-        <p:nvSpPr>
-          <p:cNvPr id="10" name="Rectangle 9">
-            <a:extLst>
-              <a:ext uri="{FF2B5EF4-FFF2-40B4-BE49-F238E27FC236}">
-                <a16:creationId xmlns:a16="http://schemas.microsoft.com/office/drawing/2014/main" id="{F5799364-C1C5-4D1E-8D26-18A86A1FC2C8}"/>
+          <a:p>
+            <a:pPr algn="ctr"/>
+            <a:endParaRPr lang="LID4096" sz="1200" dirty="0"/>
+          </a:p>
+        </p:txBody>
+      </p:sp>
+      <p:sp>
+        <p:nvSpPr>
+          <p:cNvPr id="12" name="Rectangle 11">
+            <a:extLst>
+              <a:ext uri="{FF2B5EF4-FFF2-40B4-BE49-F238E27FC236}">
+                <a16:creationId xmlns:a16="http://schemas.microsoft.com/office/drawing/2014/main" id="{39024E21-DCFE-4C1A-B1DB-20CD73F52B3B}"/>
               </a:ext>
             </a:extLst>
           </p:cNvPr>
@@ -3686,8 +3622,8 @@
         </p:nvSpPr>
         <p:spPr>
           <a:xfrm>
-            <a:off x="4477320" y="4739649"/>
-            <a:ext cx="963509" cy="1150326"/>
+            <a:off x="361161" y="4745131"/>
+            <a:ext cx="963509" cy="1150330"/>
           </a:xfrm>
           <a:prstGeom prst="rect">
             <a:avLst/>
@@ -3713,21 +3649,67 @@
           <a:bodyPr rtlCol="0" anchor="ctr"/>
           <a:lstStyle/>
           <a:p>
-            <a:pPr algn="ctr"/>
-            <a:r>
-              <a:rPr lang="en-US" sz="1200" dirty="0"/>
-              <a:t>Relay -&gt; control fridge power</a:t>
-            </a:r>
-            <a:endParaRPr lang="LID4096" sz="1200" dirty="0"/>
-          </a:p>
-        </p:txBody>
-      </p:sp>
-      <p:sp>
-        <p:nvSpPr>
-          <p:cNvPr id="11" name="Rectangle 10">
-            <a:extLst>
-              <a:ext uri="{FF2B5EF4-FFF2-40B4-BE49-F238E27FC236}">
-                <a16:creationId xmlns:a16="http://schemas.microsoft.com/office/drawing/2014/main" id="{1EA37D1F-2C12-4B6E-935C-27196AA5B799}"/>
+            <a:r>
+              <a:rPr lang="fi-FI" sz="1200" dirty="0"/>
+              <a:t>DS18B20 </a:t>
+            </a:r>
+            <a:r>
+              <a:rPr lang="fi-FI" sz="1200" dirty="0" err="1"/>
+              <a:t>one-wire</a:t>
+            </a:r>
+            <a:r>
+              <a:rPr lang="fi-FI" sz="1200" dirty="0"/>
+              <a:t> </a:t>
+            </a:r>
+            <a:r>
+              <a:rPr lang="fi-FI" sz="1200" dirty="0" err="1"/>
+              <a:t>digital</a:t>
+            </a:r>
+            <a:r>
+              <a:rPr lang="fi-FI" sz="1200" dirty="0"/>
+              <a:t> </a:t>
+            </a:r>
+            <a:r>
+              <a:rPr lang="fi-FI" sz="1200" dirty="0" err="1"/>
+              <a:t>temp</a:t>
+            </a:r>
+            <a:r>
+              <a:rPr lang="fi-FI" sz="1200" dirty="0"/>
+              <a:t> </a:t>
+            </a:r>
+            <a:r>
+              <a:rPr lang="fi-FI" sz="1200" dirty="0" err="1"/>
+              <a:t>sensor</a:t>
+            </a:r>
+            <a:r>
+              <a:rPr lang="fi-FI" sz="1200" dirty="0"/>
+              <a:t> -&gt; </a:t>
+            </a:r>
+            <a:br>
+              <a:rPr lang="fi-FI" sz="1200" dirty="0"/>
+            </a:br>
+            <a:r>
+              <a:rPr lang="fi-FI" sz="1200" dirty="0" err="1"/>
+              <a:t>fridge</a:t>
+            </a:r>
+            <a:r>
+              <a:rPr lang="fi-FI" sz="1200" dirty="0"/>
+              <a:t> air </a:t>
+            </a:r>
+            <a:r>
+              <a:rPr lang="fi-FI" sz="1200" dirty="0" err="1"/>
+              <a:t>temp</a:t>
+            </a:r>
+            <a:endParaRPr lang="fi-FI" sz="1200" dirty="0"/>
+          </a:p>
+        </p:txBody>
+      </p:sp>
+      <p:sp>
+        <p:nvSpPr>
+          <p:cNvPr id="13" name="Rectangle 12">
+            <a:extLst>
+              <a:ext uri="{FF2B5EF4-FFF2-40B4-BE49-F238E27FC236}">
+                <a16:creationId xmlns:a16="http://schemas.microsoft.com/office/drawing/2014/main" id="{E9D9B571-FD2A-4941-86B1-E5AE99893793}"/>
               </a:ext>
             </a:extLst>
           </p:cNvPr>
@@ -3736,8 +3718,8 @@
         </p:nvSpPr>
         <p:spPr>
           <a:xfrm>
-            <a:off x="3453942" y="4745132"/>
-            <a:ext cx="963509" cy="1150327"/>
+            <a:off x="1384539" y="4745131"/>
+            <a:ext cx="963509" cy="1150329"/>
           </a:xfrm>
           <a:prstGeom prst="rect">
             <a:avLst/>
@@ -3763,60 +3745,6 @@
           <a:bodyPr rtlCol="0" anchor="ctr"/>
           <a:lstStyle/>
           <a:p>
-            <a:pPr algn="ctr"/>
-            <a:r>
-              <a:rPr lang="en-US" sz="1200" dirty="0"/>
-              <a:t>Relay -&gt; control heating pad</a:t>
-            </a:r>
-            <a:endParaRPr lang="LID4096" sz="1200" dirty="0"/>
-          </a:p>
-          <a:p>
-            <a:pPr algn="ctr"/>
-            <a:endParaRPr lang="LID4096" sz="1200" dirty="0"/>
-          </a:p>
-        </p:txBody>
-      </p:sp>
-      <p:sp>
-        <p:nvSpPr>
-          <p:cNvPr id="12" name="Rectangle 11">
-            <a:extLst>
-              <a:ext uri="{FF2B5EF4-FFF2-40B4-BE49-F238E27FC236}">
-                <a16:creationId xmlns:a16="http://schemas.microsoft.com/office/drawing/2014/main" id="{39024E21-DCFE-4C1A-B1DB-20CD73F52B3B}"/>
-              </a:ext>
-            </a:extLst>
-          </p:cNvPr>
-          <p:cNvSpPr/>
-          <p:nvPr/>
-        </p:nvSpPr>
-        <p:spPr>
-          <a:xfrm>
-            <a:off x="361161" y="4745131"/>
-            <a:ext cx="963509" cy="1150330"/>
-          </a:xfrm>
-          <a:prstGeom prst="rect">
-            <a:avLst/>
-          </a:prstGeom>
-        </p:spPr>
-        <p:style>
-          <a:lnRef idx="2">
-            <a:schemeClr val="accent1">
-              <a:shade val="50000"/>
-            </a:schemeClr>
-          </a:lnRef>
-          <a:fillRef idx="1">
-            <a:schemeClr val="accent1"/>
-          </a:fillRef>
-          <a:effectRef idx="0">
-            <a:schemeClr val="accent1"/>
-          </a:effectRef>
-          <a:fontRef idx="minor">
-            <a:schemeClr val="lt1"/>
-          </a:fontRef>
-        </p:style>
-        <p:txBody>
-          <a:bodyPr rtlCol="0" anchor="ctr"/>
-          <a:lstStyle/>
-          <a:p>
             <a:r>
               <a:rPr lang="fi-FI" sz="1200" dirty="0"/>
               <a:t>DS18B20 </a:t>
@@ -3853,102 +3781,6 @@
               <a:rPr lang="fi-FI" sz="1200" dirty="0"/>
               <a:t> -&gt; </a:t>
             </a:r>
-            <a:br>
-              <a:rPr lang="fi-FI" sz="1200" dirty="0"/>
-            </a:br>
-            <a:r>
-              <a:rPr lang="fi-FI" sz="1200" dirty="0" err="1"/>
-              <a:t>fridge</a:t>
-            </a:r>
-            <a:r>
-              <a:rPr lang="fi-FI" sz="1200" dirty="0"/>
-              <a:t> air </a:t>
-            </a:r>
-            <a:r>
-              <a:rPr lang="fi-FI" sz="1200" dirty="0" err="1"/>
-              <a:t>temp</a:t>
-            </a:r>
-            <a:endParaRPr lang="fi-FI" sz="1200" dirty="0"/>
-          </a:p>
-        </p:txBody>
-      </p:sp>
-      <p:sp>
-        <p:nvSpPr>
-          <p:cNvPr id="13" name="Rectangle 12">
-            <a:extLst>
-              <a:ext uri="{FF2B5EF4-FFF2-40B4-BE49-F238E27FC236}">
-                <a16:creationId xmlns:a16="http://schemas.microsoft.com/office/drawing/2014/main" id="{E9D9B571-FD2A-4941-86B1-E5AE99893793}"/>
-              </a:ext>
-            </a:extLst>
-          </p:cNvPr>
-          <p:cNvSpPr/>
-          <p:nvPr/>
-        </p:nvSpPr>
-        <p:spPr>
-          <a:xfrm>
-            <a:off x="1384539" y="4745131"/>
-            <a:ext cx="963509" cy="1150329"/>
-          </a:xfrm>
-          <a:prstGeom prst="rect">
-            <a:avLst/>
-          </a:prstGeom>
-        </p:spPr>
-        <p:style>
-          <a:lnRef idx="2">
-            <a:schemeClr val="accent1">
-              <a:shade val="50000"/>
-            </a:schemeClr>
-          </a:lnRef>
-          <a:fillRef idx="1">
-            <a:schemeClr val="accent1"/>
-          </a:fillRef>
-          <a:effectRef idx="0">
-            <a:schemeClr val="accent1"/>
-          </a:effectRef>
-          <a:fontRef idx="minor">
-            <a:schemeClr val="lt1"/>
-          </a:fontRef>
-        </p:style>
-        <p:txBody>
-          <a:bodyPr rtlCol="0" anchor="ctr"/>
-          <a:lstStyle/>
-          <a:p>
-            <a:r>
-              <a:rPr lang="fi-FI" sz="1200" dirty="0"/>
-              <a:t>DS18B20 </a:t>
-            </a:r>
-            <a:r>
-              <a:rPr lang="fi-FI" sz="1200" dirty="0" err="1"/>
-              <a:t>one-wire</a:t>
-            </a:r>
-            <a:r>
-              <a:rPr lang="fi-FI" sz="1200" dirty="0"/>
-              <a:t> </a:t>
-            </a:r>
-            <a:r>
-              <a:rPr lang="fi-FI" sz="1200" dirty="0" err="1"/>
-              <a:t>digital</a:t>
-            </a:r>
-            <a:r>
-              <a:rPr lang="fi-FI" sz="1200" dirty="0"/>
-              <a:t> </a:t>
-            </a:r>
-            <a:r>
-              <a:rPr lang="fi-FI" sz="1200" dirty="0" err="1"/>
-              <a:t>temp</a:t>
-            </a:r>
-            <a:r>
-              <a:rPr lang="fi-FI" sz="1200" dirty="0"/>
-              <a:t> </a:t>
-            </a:r>
-            <a:r>
-              <a:rPr lang="fi-FI" sz="1200" dirty="0" err="1"/>
-              <a:t>sensor</a:t>
-            </a:r>
-            <a:r>
-              <a:rPr lang="fi-FI" sz="1200" dirty="0"/>
-              <a:t> -&gt; </a:t>
-            </a:r>
             <a:r>
               <a:rPr lang="fi-FI" sz="1200" dirty="0" err="1"/>
               <a:t>thermalwell</a:t>
@@ -3957,113 +3789,28 @@
           </a:p>
         </p:txBody>
       </p:sp>
-      <p:sp>
-        <p:nvSpPr>
-          <p:cNvPr id="14" name="Rectangle 13">
-            <a:extLst>
-              <a:ext uri="{FF2B5EF4-FFF2-40B4-BE49-F238E27FC236}">
-                <a16:creationId xmlns:a16="http://schemas.microsoft.com/office/drawing/2014/main" id="{639F341F-C494-447F-AAD5-F1742ED1D091}"/>
-              </a:ext>
-            </a:extLst>
-          </p:cNvPr>
-          <p:cNvSpPr/>
-          <p:nvPr/>
-        </p:nvSpPr>
-        <p:spPr>
-          <a:xfrm>
-            <a:off x="2420199" y="4742390"/>
-            <a:ext cx="963509" cy="1155592"/>
-          </a:xfrm>
-          <a:prstGeom prst="rect">
-            <a:avLst/>
-          </a:prstGeom>
-        </p:spPr>
-        <p:style>
-          <a:lnRef idx="2">
-            <a:schemeClr val="accent1">
-              <a:shade val="50000"/>
-            </a:schemeClr>
-          </a:lnRef>
-          <a:fillRef idx="1">
-            <a:schemeClr val="accent1"/>
-          </a:fillRef>
-          <a:effectRef idx="0">
-            <a:schemeClr val="accent1"/>
-          </a:effectRef>
-          <a:fontRef idx="minor">
-            <a:schemeClr val="lt1"/>
-          </a:fontRef>
-        </p:style>
-        <p:txBody>
-          <a:bodyPr rtlCol="0" anchor="ctr"/>
-          <a:lstStyle/>
-          <a:p>
-            <a:r>
-              <a:rPr lang="fi-FI" sz="1200" dirty="0"/>
-              <a:t>LM35 </a:t>
-            </a:r>
-            <a:r>
-              <a:rPr lang="fi-FI" sz="1200" dirty="0" err="1"/>
-              <a:t>analog</a:t>
-            </a:r>
-            <a:r>
-              <a:rPr lang="fi-FI" sz="1200" dirty="0"/>
-              <a:t> </a:t>
-            </a:r>
-            <a:r>
-              <a:rPr lang="fi-FI" sz="1200" dirty="0" err="1"/>
-              <a:t>temp</a:t>
-            </a:r>
-            <a:r>
-              <a:rPr lang="fi-FI" sz="1200" dirty="0"/>
-              <a:t> </a:t>
-            </a:r>
-            <a:r>
-              <a:rPr lang="fi-FI" sz="1200" dirty="0" err="1"/>
-              <a:t>Sensor</a:t>
-            </a:r>
-            <a:r>
-              <a:rPr lang="fi-FI" sz="1200" dirty="0"/>
-              <a:t> -&gt; </a:t>
-            </a:r>
-            <a:r>
-              <a:rPr lang="fi-FI" sz="1200" dirty="0" err="1"/>
-              <a:t>internal</a:t>
-            </a:r>
-            <a:r>
-              <a:rPr lang="fi-FI" sz="1200" dirty="0"/>
-              <a:t> </a:t>
-            </a:r>
-            <a:r>
-              <a:rPr lang="fi-FI" sz="1200" dirty="0" err="1"/>
-              <a:t>temp</a:t>
-            </a:r>
-            <a:endParaRPr lang="fi-FI" sz="1200" dirty="0"/>
-          </a:p>
-        </p:txBody>
-      </p:sp>
       <p:cxnSp>
         <p:nvCxnSpPr>
-          <p:cNvPr id="17" name="Connector: Elbow 16">
-            <a:extLst>
-              <a:ext uri="{FF2B5EF4-FFF2-40B4-BE49-F238E27FC236}">
-                <a16:creationId xmlns:a16="http://schemas.microsoft.com/office/drawing/2014/main" id="{1836FFDA-E5EC-4812-9FE0-89AC6A5CD4D6}"/>
+          <p:cNvPr id="19" name="Connector: Elbow 18">
+            <a:extLst>
+              <a:ext uri="{FF2B5EF4-FFF2-40B4-BE49-F238E27FC236}">
+                <a16:creationId xmlns:a16="http://schemas.microsoft.com/office/drawing/2014/main" id="{714506D7-CBA5-454D-8081-15B1B649314A}"/>
               </a:ext>
             </a:extLst>
           </p:cNvPr>
           <p:cNvCxnSpPr>
             <a:cxnSpLocks/>
-            <a:stCxn id="4" idx="2"/>
-            <a:endCxn id="14" idx="0"/>
+            <a:stCxn id="5" idx="1"/>
+            <a:endCxn id="38" idx="4"/>
           </p:cNvCxnSpPr>
           <p:nvPr/>
         </p:nvCxnSpPr>
         <p:spPr>
-          <a:xfrm rot="16200000" flipH="1">
-            <a:off x="1771494" y="3611929"/>
-            <a:ext cx="1472279" cy="788641"/>
-          </a:xfrm>
-          <a:prstGeom prst="bentConnector3">
+          <a:xfrm rot="10800000" flipV="1">
+            <a:off x="1341652" y="2604496"/>
+            <a:ext cx="4747221" cy="1672934"/>
+          </a:xfrm>
+          <a:prstGeom prst="bentConnector2">
             <a:avLst/>
           </a:prstGeom>
           <a:ln w="12700">
@@ -4089,24 +3836,69 @@
       </p:cxnSp>
       <p:cxnSp>
         <p:nvCxnSpPr>
-          <p:cNvPr id="19" name="Connector: Elbow 18">
-            <a:extLst>
-              <a:ext uri="{FF2B5EF4-FFF2-40B4-BE49-F238E27FC236}">
-                <a16:creationId xmlns:a16="http://schemas.microsoft.com/office/drawing/2014/main" id="{714506D7-CBA5-454D-8081-15B1B649314A}"/>
+          <p:cNvPr id="21" name="Connector: Elbow 20">
+            <a:extLst>
+              <a:ext uri="{FF2B5EF4-FFF2-40B4-BE49-F238E27FC236}">
+                <a16:creationId xmlns:a16="http://schemas.microsoft.com/office/drawing/2014/main" id="{BC9AF60B-221F-4B7A-89A7-40F55C4BD4BB}"/>
               </a:ext>
             </a:extLst>
           </p:cNvPr>
           <p:cNvCxnSpPr>
             <a:cxnSpLocks/>
-            <a:stCxn id="4" idx="2"/>
-            <a:endCxn id="38" idx="4"/>
+            <a:stCxn id="38" idx="2"/>
+            <a:endCxn id="12" idx="0"/>
           </p:cNvCxnSpPr>
           <p:nvPr/>
         </p:nvCxnSpPr>
         <p:spPr>
+          <a:xfrm rot="10800000" flipV="1">
+            <a:off x="842917" y="4328859"/>
+            <a:ext cx="451981" cy="416272"/>
+          </a:xfrm>
+          <a:prstGeom prst="bentConnector2">
+            <a:avLst/>
+          </a:prstGeom>
+          <a:ln w="12700">
+            <a:solidFill>
+              <a:schemeClr val="tx1"/>
+            </a:solidFill>
+          </a:ln>
+        </p:spPr>
+        <p:style>
+          <a:lnRef idx="1">
+            <a:schemeClr val="accent1"/>
+          </a:lnRef>
+          <a:fillRef idx="0">
+            <a:schemeClr val="accent1"/>
+          </a:fillRef>
+          <a:effectRef idx="0">
+            <a:schemeClr val="accent1"/>
+          </a:effectRef>
+          <a:fontRef idx="minor">
+            <a:schemeClr val="tx1"/>
+          </a:fontRef>
+        </p:style>
+      </p:cxnSp>
+      <p:cxnSp>
+        <p:nvCxnSpPr>
+          <p:cNvPr id="23" name="Connector: Elbow 22">
+            <a:extLst>
+              <a:ext uri="{FF2B5EF4-FFF2-40B4-BE49-F238E27FC236}">
+                <a16:creationId xmlns:a16="http://schemas.microsoft.com/office/drawing/2014/main" id="{D23EC554-7128-4EDF-AEC5-95067341F758}"/>
+              </a:ext>
+            </a:extLst>
+          </p:cNvPr>
+          <p:cNvCxnSpPr>
+            <a:cxnSpLocks/>
+            <a:stCxn id="159" idx="2"/>
+            <a:endCxn id="11" idx="0"/>
+          </p:cNvCxnSpPr>
+          <p:nvPr/>
+        </p:nvCxnSpPr>
+        <p:spPr>
           <a:xfrm rot="5400000">
-            <a:off x="1223823" y="3387939"/>
-            <a:ext cx="1007319" cy="771662"/>
+            <a:off x="5840957" y="1679765"/>
+            <a:ext cx="1160107" cy="4970626"/>
           </a:xfrm>
           <a:prstGeom prst="bentConnector3">
             <a:avLst>
@@ -4136,26 +3928,26 @@
       </p:cxnSp>
       <p:cxnSp>
         <p:nvCxnSpPr>
-          <p:cNvPr id="21" name="Connector: Elbow 20">
-            <a:extLst>
-              <a:ext uri="{FF2B5EF4-FFF2-40B4-BE49-F238E27FC236}">
-                <a16:creationId xmlns:a16="http://schemas.microsoft.com/office/drawing/2014/main" id="{BC9AF60B-221F-4B7A-89A7-40F55C4BD4BB}"/>
+          <p:cNvPr id="26" name="Connector: Elbow 25">
+            <a:extLst>
+              <a:ext uri="{FF2B5EF4-FFF2-40B4-BE49-F238E27FC236}">
+                <a16:creationId xmlns:a16="http://schemas.microsoft.com/office/drawing/2014/main" id="{85C17885-666E-49A6-A833-EF8F93CFC346}"/>
               </a:ext>
             </a:extLst>
           </p:cNvPr>
           <p:cNvCxnSpPr>
             <a:cxnSpLocks/>
-            <a:stCxn id="38" idx="2"/>
-            <a:endCxn id="12" idx="0"/>
+            <a:stCxn id="159" idx="2"/>
+            <a:endCxn id="10" idx="0"/>
           </p:cNvCxnSpPr>
           <p:nvPr/>
         </p:nvCxnSpPr>
         <p:spPr>
-          <a:xfrm rot="10800000" flipV="1">
-            <a:off x="842917" y="4328859"/>
-            <a:ext cx="451981" cy="416272"/>
-          </a:xfrm>
-          <a:prstGeom prst="bentConnector2">
+          <a:xfrm rot="5400000">
+            <a:off x="6355387" y="2188713"/>
+            <a:ext cx="1154624" cy="3947248"/>
+          </a:xfrm>
+          <a:prstGeom prst="bentConnector3">
             <a:avLst/>
           </a:prstGeom>
           <a:ln w="12700">
@@ -4181,24 +3973,69 @@
       </p:cxnSp>
       <p:cxnSp>
         <p:nvCxnSpPr>
-          <p:cNvPr id="23" name="Connector: Elbow 22">
-            <a:extLst>
-              <a:ext uri="{FF2B5EF4-FFF2-40B4-BE49-F238E27FC236}">
-                <a16:creationId xmlns:a16="http://schemas.microsoft.com/office/drawing/2014/main" id="{D23EC554-7128-4EDF-AEC5-95067341F758}"/>
+          <p:cNvPr id="28" name="Connector: Elbow 27">
+            <a:extLst>
+              <a:ext uri="{FF2B5EF4-FFF2-40B4-BE49-F238E27FC236}">
+                <a16:creationId xmlns:a16="http://schemas.microsoft.com/office/drawing/2014/main" id="{9209B8F2-F4F8-4BF0-AD37-3CF2C86F9105}"/>
               </a:ext>
             </a:extLst>
           </p:cNvPr>
           <p:cNvCxnSpPr>
             <a:cxnSpLocks/>
-            <a:stCxn id="4" idx="2"/>
-            <a:endCxn id="11" idx="0"/>
+            <a:stCxn id="159" idx="2"/>
+            <a:endCxn id="9" idx="0"/>
           </p:cNvCxnSpPr>
           <p:nvPr/>
         </p:nvCxnSpPr>
         <p:spPr>
-          <a:xfrm rot="16200000" flipH="1">
-            <a:off x="2286995" y="3096429"/>
-            <a:ext cx="1475021" cy="1822384"/>
+          <a:xfrm rot="5400000">
+            <a:off x="6864335" y="2703143"/>
+            <a:ext cx="1160107" cy="2923870"/>
+          </a:xfrm>
+          <a:prstGeom prst="bentConnector3">
+            <a:avLst/>
+          </a:prstGeom>
+          <a:ln w="12700">
+            <a:solidFill>
+              <a:schemeClr val="tx1"/>
+            </a:solidFill>
+          </a:ln>
+        </p:spPr>
+        <p:style>
+          <a:lnRef idx="1">
+            <a:schemeClr val="accent1"/>
+          </a:lnRef>
+          <a:fillRef idx="0">
+            <a:schemeClr val="accent1"/>
+          </a:fillRef>
+          <a:effectRef idx="0">
+            <a:schemeClr val="accent1"/>
+          </a:effectRef>
+          <a:fontRef idx="minor">
+            <a:schemeClr val="tx1"/>
+          </a:fontRef>
+        </p:style>
+      </p:cxnSp>
+      <p:cxnSp>
+        <p:nvCxnSpPr>
+          <p:cNvPr id="30" name="Connector: Elbow 29">
+            <a:extLst>
+              <a:ext uri="{FF2B5EF4-FFF2-40B4-BE49-F238E27FC236}">
+                <a16:creationId xmlns:a16="http://schemas.microsoft.com/office/drawing/2014/main" id="{5A05D713-4BB3-4140-ACE5-56688D8DB8FB}"/>
+              </a:ext>
+            </a:extLst>
+          </p:cNvPr>
+          <p:cNvCxnSpPr>
+            <a:cxnSpLocks/>
+            <a:stCxn id="159" idx="2"/>
+            <a:endCxn id="8" idx="0"/>
+          </p:cNvCxnSpPr>
+          <p:nvPr/>
+        </p:nvCxnSpPr>
+        <p:spPr>
+          <a:xfrm rot="5400000">
+            <a:off x="7378765" y="3212089"/>
+            <a:ext cx="1154622" cy="1900494"/>
           </a:xfrm>
           <a:prstGeom prst="bentConnector3">
             <a:avLst>
@@ -4226,143 +4063,6 @@
           </a:fontRef>
         </p:style>
       </p:cxnSp>
-      <p:cxnSp>
-        <p:nvCxnSpPr>
-          <p:cNvPr id="26" name="Connector: Elbow 25">
-            <a:extLst>
-              <a:ext uri="{FF2B5EF4-FFF2-40B4-BE49-F238E27FC236}">
-                <a16:creationId xmlns:a16="http://schemas.microsoft.com/office/drawing/2014/main" id="{85C17885-666E-49A6-A833-EF8F93CFC346}"/>
-              </a:ext>
-            </a:extLst>
-          </p:cNvPr>
-          <p:cNvCxnSpPr>
-            <a:cxnSpLocks/>
-            <a:stCxn id="4" idx="2"/>
-            <a:endCxn id="10" idx="0"/>
-          </p:cNvCxnSpPr>
-          <p:nvPr/>
-        </p:nvCxnSpPr>
-        <p:spPr>
-          <a:xfrm rot="16200000" flipH="1">
-            <a:off x="2801425" y="2581999"/>
-            <a:ext cx="1469538" cy="2845762"/>
-          </a:xfrm>
-          <a:prstGeom prst="bentConnector3">
-            <a:avLst/>
-          </a:prstGeom>
-          <a:ln w="12700">
-            <a:solidFill>
-              <a:schemeClr val="tx1"/>
-            </a:solidFill>
-          </a:ln>
-        </p:spPr>
-        <p:style>
-          <a:lnRef idx="1">
-            <a:schemeClr val="accent1"/>
-          </a:lnRef>
-          <a:fillRef idx="0">
-            <a:schemeClr val="accent1"/>
-          </a:fillRef>
-          <a:effectRef idx="0">
-            <a:schemeClr val="accent1"/>
-          </a:effectRef>
-          <a:fontRef idx="minor">
-            <a:schemeClr val="tx1"/>
-          </a:fontRef>
-        </p:style>
-      </p:cxnSp>
-      <p:cxnSp>
-        <p:nvCxnSpPr>
-          <p:cNvPr id="28" name="Connector: Elbow 27">
-            <a:extLst>
-              <a:ext uri="{FF2B5EF4-FFF2-40B4-BE49-F238E27FC236}">
-                <a16:creationId xmlns:a16="http://schemas.microsoft.com/office/drawing/2014/main" id="{9209B8F2-F4F8-4BF0-AD37-3CF2C86F9105}"/>
-              </a:ext>
-            </a:extLst>
-          </p:cNvPr>
-          <p:cNvCxnSpPr>
-            <a:cxnSpLocks/>
-            <a:stCxn id="4" idx="2"/>
-            <a:endCxn id="9" idx="0"/>
-          </p:cNvCxnSpPr>
-          <p:nvPr/>
-        </p:nvCxnSpPr>
-        <p:spPr>
-          <a:xfrm rot="16200000" flipH="1">
-            <a:off x="3310373" y="2073051"/>
-            <a:ext cx="1475021" cy="3869140"/>
-          </a:xfrm>
-          <a:prstGeom prst="bentConnector3">
-            <a:avLst/>
-          </a:prstGeom>
-          <a:ln w="12700">
-            <a:solidFill>
-              <a:schemeClr val="tx1"/>
-            </a:solidFill>
-          </a:ln>
-        </p:spPr>
-        <p:style>
-          <a:lnRef idx="1">
-            <a:schemeClr val="accent1"/>
-          </a:lnRef>
-          <a:fillRef idx="0">
-            <a:schemeClr val="accent1"/>
-          </a:fillRef>
-          <a:effectRef idx="0">
-            <a:schemeClr val="accent1"/>
-          </a:effectRef>
-          <a:fontRef idx="minor">
-            <a:schemeClr val="tx1"/>
-          </a:fontRef>
-        </p:style>
-      </p:cxnSp>
-      <p:cxnSp>
-        <p:nvCxnSpPr>
-          <p:cNvPr id="30" name="Connector: Elbow 29">
-            <a:extLst>
-              <a:ext uri="{FF2B5EF4-FFF2-40B4-BE49-F238E27FC236}">
-                <a16:creationId xmlns:a16="http://schemas.microsoft.com/office/drawing/2014/main" id="{5A05D713-4BB3-4140-ACE5-56688D8DB8FB}"/>
-              </a:ext>
-            </a:extLst>
-          </p:cNvPr>
-          <p:cNvCxnSpPr>
-            <a:cxnSpLocks/>
-            <a:stCxn id="4" idx="2"/>
-            <a:endCxn id="8" idx="0"/>
-          </p:cNvCxnSpPr>
-          <p:nvPr/>
-        </p:nvCxnSpPr>
-        <p:spPr>
-          <a:xfrm rot="16200000" flipH="1">
-            <a:off x="3824803" y="1558621"/>
-            <a:ext cx="1469536" cy="4892516"/>
-          </a:xfrm>
-          <a:prstGeom prst="bentConnector3">
-            <a:avLst>
-              <a:gd name="adj1" fmla="val 50000"/>
-            </a:avLst>
-          </a:prstGeom>
-          <a:ln w="12700">
-            <a:solidFill>
-              <a:schemeClr val="tx1"/>
-            </a:solidFill>
-          </a:ln>
-        </p:spPr>
-        <p:style>
-          <a:lnRef idx="1">
-            <a:schemeClr val="accent1"/>
-          </a:lnRef>
-          <a:fillRef idx="0">
-            <a:schemeClr val="accent1"/>
-          </a:fillRef>
-          <a:effectRef idx="0">
-            <a:schemeClr val="accent1"/>
-          </a:effectRef>
-          <a:fontRef idx="minor">
-            <a:schemeClr val="tx1"/>
-          </a:fontRef>
-        </p:style>
-      </p:cxnSp>
       <p:sp>
         <p:nvSpPr>
           <p:cNvPr id="33" name="TextBox 32">
@@ -4377,8 +4077,8 @@
         </p:nvSpPr>
         <p:spPr>
           <a:xfrm>
-            <a:off x="6752394" y="4303008"/>
-            <a:ext cx="506870" cy="307777"/>
+            <a:off x="6706708" y="4303008"/>
+            <a:ext cx="598242" cy="307777"/>
           </a:xfrm>
           <a:prstGeom prst="rect">
             <a:avLst/>
@@ -4396,7 +4096,7 @@
             <a:pPr algn="ctr"/>
             <a:r>
               <a:rPr lang="en-US" sz="1400" dirty="0"/>
-              <a:t>pin7</a:t>
+              <a:t>pin24</a:t>
             </a:r>
             <a:endParaRPr lang="LID4096" sz="1400" dirty="0"/>
           </a:p>
@@ -4416,8 +4116,8 @@
         </p:nvSpPr>
         <p:spPr>
           <a:xfrm>
-            <a:off x="5731371" y="4303008"/>
-            <a:ext cx="506870" cy="307777"/>
+            <a:off x="5685685" y="4303008"/>
+            <a:ext cx="598242" cy="307777"/>
           </a:xfrm>
           <a:prstGeom prst="rect">
             <a:avLst/>
@@ -4435,7 +4135,7 @@
             <a:pPr algn="ctr"/>
             <a:r>
               <a:rPr lang="en-US" sz="1400" dirty="0"/>
-              <a:t>pin8</a:t>
+              <a:t>pin23</a:t>
             </a:r>
             <a:endParaRPr lang="LID4096" sz="1400" dirty="0"/>
           </a:p>
@@ -4474,7 +4174,7 @@
             <a:pPr algn="ctr"/>
             <a:r>
               <a:rPr lang="en-US" sz="1400" dirty="0"/>
-              <a:t>pin9</a:t>
+              <a:t>pin6</a:t>
             </a:r>
             <a:endParaRPr lang="LID4096" sz="1400" dirty="0"/>
           </a:p>
@@ -4494,8 +4194,8 @@
         </p:nvSpPr>
         <p:spPr>
           <a:xfrm>
-            <a:off x="1095171" y="3798317"/>
-            <a:ext cx="506870" cy="307777"/>
+            <a:off x="1071126" y="3798317"/>
+            <a:ext cx="554960" cy="307777"/>
           </a:xfrm>
           <a:prstGeom prst="rect">
             <a:avLst/>
@@ -4513,46 +4213,7 @@
             <a:pPr algn="ctr"/>
             <a:r>
               <a:rPr lang="en-US" sz="1400" dirty="0"/>
-              <a:t>pin2</a:t>
-            </a:r>
-            <a:endParaRPr lang="LID4096" sz="1400" dirty="0"/>
-          </a:p>
-        </p:txBody>
-      </p:sp>
-      <p:sp>
-        <p:nvSpPr>
-          <p:cNvPr id="37" name="TextBox 36">
-            <a:extLst>
-              <a:ext uri="{FF2B5EF4-FFF2-40B4-BE49-F238E27FC236}">
-                <a16:creationId xmlns:a16="http://schemas.microsoft.com/office/drawing/2014/main" id="{0F2BF014-0D82-407B-9184-AA334B19391C}"/>
-              </a:ext>
-            </a:extLst>
-          </p:cNvPr>
-          <p:cNvSpPr txBox="1"/>
-          <p:nvPr/>
-        </p:nvSpPr>
-        <p:spPr>
-          <a:xfrm>
-            <a:off x="2696357" y="4303008"/>
-            <a:ext cx="380232" cy="307777"/>
-          </a:xfrm>
-          <a:prstGeom prst="rect">
-            <a:avLst/>
-          </a:prstGeom>
-          <a:solidFill>
-            <a:schemeClr val="bg1"/>
-          </a:solidFill>
-        </p:spPr>
-        <p:txBody>
-          <a:bodyPr wrap="none" rtlCol="0">
-            <a:spAutoFit/>
-          </a:bodyPr>
-          <a:lstStyle/>
-          <a:p>
-            <a:pPr algn="ctr"/>
-            <a:r>
-              <a:rPr lang="en-US" sz="1400" dirty="0"/>
-              <a:t>A6</a:t>
+              <a:t>GPIO</a:t>
             </a:r>
             <a:endParaRPr lang="LID4096" sz="1400" dirty="0"/>
           </a:p>
@@ -4663,8 +4324,8 @@
         </p:nvSpPr>
         <p:spPr>
           <a:xfrm>
-            <a:off x="3585131" y="4303008"/>
-            <a:ext cx="598241" cy="307777"/>
+            <a:off x="3630816" y="4303008"/>
+            <a:ext cx="506870" cy="307777"/>
           </a:xfrm>
           <a:prstGeom prst="rect">
             <a:avLst/>
@@ -4682,7 +4343,7 @@
             <a:pPr algn="ctr"/>
             <a:r>
               <a:rPr lang="en-US" sz="1400" dirty="0"/>
-              <a:t>pin10</a:t>
+              <a:t>pin5</a:t>
             </a:r>
             <a:endParaRPr lang="LID4096" sz="1400" dirty="0"/>
           </a:p>
@@ -5202,101 +4863,12 @@
           </a:p>
         </p:txBody>
       </p:sp>
-      <p:cxnSp>
-        <p:nvCxnSpPr>
-          <p:cNvPr id="122" name="Connector: Elbow 121">
-            <a:extLst>
-              <a:ext uri="{FF2B5EF4-FFF2-40B4-BE49-F238E27FC236}">
-                <a16:creationId xmlns:a16="http://schemas.microsoft.com/office/drawing/2014/main" id="{BFA81B90-4A5F-4B05-9F78-AC4702ECB7C0}"/>
-              </a:ext>
-            </a:extLst>
-          </p:cNvPr>
-          <p:cNvCxnSpPr>
-            <a:cxnSpLocks/>
-            <a:stCxn id="5" idx="1"/>
-            <a:endCxn id="4" idx="3"/>
-          </p:cNvCxnSpPr>
-          <p:nvPr/>
-        </p:nvCxnSpPr>
-        <p:spPr>
-          <a:xfrm rot="10800000" flipV="1">
-            <a:off x="3383708" y="2604495"/>
-            <a:ext cx="2705164" cy="1737"/>
-          </a:xfrm>
-          <a:prstGeom prst="bentConnector3">
-            <a:avLst/>
-          </a:prstGeom>
-          <a:ln w="28575">
-            <a:solidFill>
-              <a:srgbClr val="FF0000"/>
-            </a:solidFill>
-          </a:ln>
-        </p:spPr>
-        <p:style>
-          <a:lnRef idx="1">
-            <a:schemeClr val="accent1"/>
-          </a:lnRef>
-          <a:fillRef idx="0">
-            <a:schemeClr val="accent1"/>
-          </a:fillRef>
-          <a:effectRef idx="0">
-            <a:schemeClr val="accent1"/>
-          </a:effectRef>
-          <a:fontRef idx="minor">
-            <a:schemeClr val="tx1"/>
-          </a:fontRef>
-        </p:style>
-      </p:cxnSp>
-      <p:sp>
-        <p:nvSpPr>
-          <p:cNvPr id="123" name="TextBox 122">
-            <a:extLst>
-              <a:ext uri="{FF2B5EF4-FFF2-40B4-BE49-F238E27FC236}">
-                <a16:creationId xmlns:a16="http://schemas.microsoft.com/office/drawing/2014/main" id="{FFC154A5-A337-4E26-8993-6E480477BB1C}"/>
-              </a:ext>
-            </a:extLst>
-          </p:cNvPr>
-          <p:cNvSpPr txBox="1"/>
-          <p:nvPr/>
-        </p:nvSpPr>
-        <p:spPr>
-          <a:xfrm>
-            <a:off x="3980231" y="2373662"/>
-            <a:ext cx="1528816" cy="461665"/>
-          </a:xfrm>
-          <a:prstGeom prst="rect">
-            <a:avLst/>
-          </a:prstGeom>
-          <a:noFill/>
-        </p:spPr>
-        <p:txBody>
-          <a:bodyPr wrap="none" rtlCol="0">
-            <a:spAutoFit/>
-          </a:bodyPr>
-          <a:lstStyle/>
-          <a:p>
-            <a:pPr algn="ctr"/>
-            <a:r>
-              <a:rPr lang="en-US" sz="1200" dirty="0"/>
-              <a:t>USB power</a:t>
-            </a:r>
-            <a:br>
-              <a:rPr lang="en-US" sz="1200" dirty="0"/>
-            </a:br>
-            <a:r>
-              <a:rPr lang="en-US" sz="1200" dirty="0"/>
-              <a:t>serial communication</a:t>
-            </a:r>
-            <a:endParaRPr lang="LID4096" sz="1200" dirty="0"/>
-          </a:p>
-        </p:txBody>
-      </p:sp>
-      <p:sp>
-        <p:nvSpPr>
-          <p:cNvPr id="135" name="Rectangle 134">
-            <a:extLst>
-              <a:ext uri="{FF2B5EF4-FFF2-40B4-BE49-F238E27FC236}">
-                <a16:creationId xmlns:a16="http://schemas.microsoft.com/office/drawing/2014/main" id="{36345AEE-42CD-4C41-AF7F-5BC5747BAE0A}"/>
+      <p:sp>
+        <p:nvSpPr>
+          <p:cNvPr id="160" name="Rectangle 159">
+            <a:extLst>
+              <a:ext uri="{FF2B5EF4-FFF2-40B4-BE49-F238E27FC236}">
+                <a16:creationId xmlns:a16="http://schemas.microsoft.com/office/drawing/2014/main" id="{DCF63F1A-7B3A-4FA0-BA47-1E121BE2CB0A}"/>
               </a:ext>
             </a:extLst>
           </p:cNvPr>
@@ -5305,7 +4877,7 @@
         </p:nvSpPr>
         <p:spPr>
           <a:xfrm>
-            <a:off x="6596566" y="2979718"/>
+            <a:off x="6596565" y="1926770"/>
             <a:ext cx="1279741" cy="605307"/>
           </a:xfrm>
           <a:prstGeom prst="rect">
@@ -5345,17 +4917,6 @@
           <a:p>
             <a:pPr algn="ctr"/>
             <a:r>
-              <a:rPr lang="en-US" sz="1400">
-                <a:solidFill>
-                  <a:schemeClr val="tx1">
-                    <a:lumMod val="50000"/>
-                    <a:lumOff val="50000"/>
-                  </a:schemeClr>
-                </a:solidFill>
-              </a:rPr>
-              <a:t>c</a:t>
-            </a:r>
-            <a:r>
               <a:rPr lang="en-US" sz="1400" dirty="0">
                 <a:solidFill>
                   <a:schemeClr val="tx1">
@@ -5364,18 +4925,7 @@
                   </a:schemeClr>
                 </a:solidFill>
               </a:rPr>
-              <a:t>ontroller</a:t>
-            </a:r>
-            <a:r>
-              <a:rPr lang="en-US" sz="1400">
-                <a:solidFill>
-                  <a:schemeClr val="tx1">
-                    <a:lumMod val="50000"/>
-                    <a:lumOff val="50000"/>
-                  </a:schemeClr>
-                </a:solidFill>
-              </a:rPr>
-              <a:t>.py</a:t>
+              <a:t>tilt.py</a:t>
             </a:r>
             <a:endParaRPr lang="LID4096" sz="1400" dirty="0">
               <a:solidFill>
@@ -5388,108 +4938,12 @@
           </a:p>
         </p:txBody>
       </p:sp>
-      <p:cxnSp>
-        <p:nvCxnSpPr>
-          <p:cNvPr id="137" name="Connector: Elbow 136">
-            <a:extLst>
-              <a:ext uri="{FF2B5EF4-FFF2-40B4-BE49-F238E27FC236}">
-                <a16:creationId xmlns:a16="http://schemas.microsoft.com/office/drawing/2014/main" id="{F28D51BA-AE00-4EAC-B683-88C27885163A}"/>
-              </a:ext>
-            </a:extLst>
-          </p:cNvPr>
-          <p:cNvCxnSpPr>
-            <a:cxnSpLocks/>
-            <a:stCxn id="4" idx="3"/>
-            <a:endCxn id="7" idx="3"/>
-          </p:cNvCxnSpPr>
-          <p:nvPr/>
-        </p:nvCxnSpPr>
-        <p:spPr>
-          <a:xfrm flipH="1" flipV="1">
-            <a:off x="3023276" y="2605741"/>
-            <a:ext cx="360432" cy="492"/>
-          </a:xfrm>
-          <a:prstGeom prst="bentConnector3">
-            <a:avLst>
-              <a:gd name="adj1" fmla="val 52705"/>
-            </a:avLst>
-          </a:prstGeom>
-          <a:ln w="12700">
-            <a:solidFill>
-              <a:schemeClr val="tx1"/>
-            </a:solidFill>
-            <a:prstDash val="dash"/>
-          </a:ln>
-        </p:spPr>
-        <p:style>
-          <a:lnRef idx="1">
-            <a:schemeClr val="accent1"/>
-          </a:lnRef>
-          <a:fillRef idx="0">
-            <a:schemeClr val="accent1"/>
-          </a:fillRef>
-          <a:effectRef idx="0">
-            <a:schemeClr val="accent1"/>
-          </a:effectRef>
-          <a:fontRef idx="minor">
-            <a:schemeClr val="tx1"/>
-          </a:fontRef>
-        </p:style>
-      </p:cxnSp>
-      <p:cxnSp>
-        <p:nvCxnSpPr>
-          <p:cNvPr id="151" name="Connector: Elbow 150">
-            <a:extLst>
-              <a:ext uri="{FF2B5EF4-FFF2-40B4-BE49-F238E27FC236}">
-                <a16:creationId xmlns:a16="http://schemas.microsoft.com/office/drawing/2014/main" id="{508D9B31-3EF3-43CE-8C95-26EAA8AB474D}"/>
-              </a:ext>
-            </a:extLst>
-          </p:cNvPr>
-          <p:cNvCxnSpPr>
-            <a:cxnSpLocks/>
-            <a:stCxn id="5" idx="1"/>
-            <a:endCxn id="135" idx="1"/>
-          </p:cNvCxnSpPr>
-          <p:nvPr/>
-        </p:nvCxnSpPr>
-        <p:spPr>
-          <a:xfrm rot="10800000" flipH="1" flipV="1">
-            <a:off x="6088872" y="2604496"/>
-            <a:ext cx="507694" cy="677876"/>
-          </a:xfrm>
-          <a:prstGeom prst="bentConnector3">
-            <a:avLst>
-              <a:gd name="adj1" fmla="val 42491"/>
-            </a:avLst>
-          </a:prstGeom>
-          <a:ln w="12700">
-            <a:solidFill>
-              <a:schemeClr val="tx1"/>
-            </a:solidFill>
-            <a:prstDash val="dash"/>
-          </a:ln>
-        </p:spPr>
-        <p:style>
-          <a:lnRef idx="1">
-            <a:schemeClr val="accent1"/>
-          </a:lnRef>
-          <a:fillRef idx="0">
-            <a:schemeClr val="accent1"/>
-          </a:fillRef>
-          <a:effectRef idx="0">
-            <a:schemeClr val="accent1"/>
-          </a:effectRef>
-          <a:fontRef idx="minor">
-            <a:schemeClr val="tx1"/>
-          </a:fontRef>
-        </p:style>
-      </p:cxnSp>
-      <p:sp>
-        <p:nvSpPr>
-          <p:cNvPr id="159" name="Rectangle 158">
-            <a:extLst>
-              <a:ext uri="{FF2B5EF4-FFF2-40B4-BE49-F238E27FC236}">
-                <a16:creationId xmlns:a16="http://schemas.microsoft.com/office/drawing/2014/main" id="{ADFBC12F-91C4-492B-9377-E0EFFBFA7AFA}"/>
+      <p:sp>
+        <p:nvSpPr>
+          <p:cNvPr id="166" name="Rectangle 165">
+            <a:extLst>
+              <a:ext uri="{FF2B5EF4-FFF2-40B4-BE49-F238E27FC236}">
+                <a16:creationId xmlns:a16="http://schemas.microsoft.com/office/drawing/2014/main" id="{32250086-BDEC-48EB-91E8-463F167DE1B0}"/>
               </a:ext>
             </a:extLst>
           </p:cNvPr>
@@ -5498,7 +4952,7 @@
         </p:nvSpPr>
         <p:spPr>
           <a:xfrm>
-            <a:off x="8266452" y="2979718"/>
+            <a:off x="8266451" y="1925795"/>
             <a:ext cx="1279741" cy="605307"/>
           </a:xfrm>
           <a:prstGeom prst="rect">
@@ -5546,7 +5000,7 @@
                   </a:schemeClr>
                 </a:solidFill>
               </a:rPr>
-              <a:t>chamber.py</a:t>
+              <a:t>interface.py</a:t>
             </a:r>
             <a:endParaRPr lang="LID4096" sz="1400" dirty="0">
               <a:solidFill>
@@ -5561,10 +5015,10 @@
       </p:sp>
       <p:sp>
         <p:nvSpPr>
-          <p:cNvPr id="160" name="Rectangle 159">
-            <a:extLst>
-              <a:ext uri="{FF2B5EF4-FFF2-40B4-BE49-F238E27FC236}">
-                <a16:creationId xmlns:a16="http://schemas.microsoft.com/office/drawing/2014/main" id="{DCF63F1A-7B3A-4FA0-BA47-1E121BE2CB0A}"/>
+          <p:cNvPr id="168" name="Rectangle 167">
+            <a:extLst>
+              <a:ext uri="{FF2B5EF4-FFF2-40B4-BE49-F238E27FC236}">
+                <a16:creationId xmlns:a16="http://schemas.microsoft.com/office/drawing/2014/main" id="{C7C53D94-9529-4330-981D-12E0AFC6ECB1}"/>
               </a:ext>
             </a:extLst>
           </p:cNvPr>
@@ -5573,7 +5027,7 @@
         </p:nvSpPr>
         <p:spPr>
           <a:xfrm>
-            <a:off x="6596565" y="1926770"/>
+            <a:off x="9933209" y="2979718"/>
             <a:ext cx="1279741" cy="605307"/>
           </a:xfrm>
           <a:prstGeom prst="rect">
@@ -5621,7 +5075,7 @@
                   </a:schemeClr>
                 </a:solidFill>
               </a:rPr>
-              <a:t>tilt.py</a:t>
+              <a:t>brewfather.py</a:t>
             </a:r>
             <a:endParaRPr lang="LID4096" sz="1400" dirty="0">
               <a:solidFill>
@@ -5636,10 +5090,10 @@
       </p:sp>
       <p:sp>
         <p:nvSpPr>
-          <p:cNvPr id="166" name="Rectangle 165">
-            <a:extLst>
-              <a:ext uri="{FF2B5EF4-FFF2-40B4-BE49-F238E27FC236}">
-                <a16:creationId xmlns:a16="http://schemas.microsoft.com/office/drawing/2014/main" id="{32250086-BDEC-48EB-91E8-463F167DE1B0}"/>
+          <p:cNvPr id="169" name="Rectangle 168">
+            <a:extLst>
+              <a:ext uri="{FF2B5EF4-FFF2-40B4-BE49-F238E27FC236}">
+                <a16:creationId xmlns:a16="http://schemas.microsoft.com/office/drawing/2014/main" id="{A07D47E8-DCA1-4EEB-9897-627C340B5C26}"/>
               </a:ext>
             </a:extLst>
           </p:cNvPr>
@@ -5648,157 +5102,7 @@
         </p:nvSpPr>
         <p:spPr>
           <a:xfrm>
-            <a:off x="8266451" y="1925795"/>
-            <a:ext cx="1279741" cy="605307"/>
-          </a:xfrm>
-          <a:prstGeom prst="rect">
-            <a:avLst/>
-          </a:prstGeom>
-          <a:solidFill>
-            <a:schemeClr val="accent1">
-              <a:lumMod val="20000"/>
-              <a:lumOff val="80000"/>
-            </a:schemeClr>
-          </a:solidFill>
-        </p:spPr>
-        <p:style>
-          <a:lnRef idx="2">
-            <a:schemeClr val="accent1">
-              <a:shade val="50000"/>
-            </a:schemeClr>
-          </a:lnRef>
-          <a:fillRef idx="1">
-            <a:schemeClr val="accent1"/>
-          </a:fillRef>
-          <a:effectRef idx="0">
-            <a:schemeClr val="accent1"/>
-          </a:effectRef>
-          <a:fontRef idx="minor">
-            <a:schemeClr val="lt1"/>
-          </a:fontRef>
-        </p:style>
-        <p:txBody>
-          <a:bodyPr rot="0" spcFirstLastPara="0" vertOverflow="overflow" horzOverflow="overflow" vert="horz" wrap="square" lIns="91440" tIns="45720" rIns="91440" bIns="45720" numCol="1" spcCol="0" rtlCol="0" fromWordArt="0" anchor="ctr" anchorCtr="0" forceAA="0" compatLnSpc="1">
-            <a:prstTxWarp prst="textNoShape">
-              <a:avLst/>
-            </a:prstTxWarp>
-            <a:noAutofit/>
-          </a:bodyPr>
-          <a:lstStyle/>
-          <a:p>
-            <a:pPr algn="ctr"/>
-            <a:r>
-              <a:rPr lang="en-US" sz="1400" dirty="0">
-                <a:solidFill>
-                  <a:schemeClr val="tx1">
-                    <a:lumMod val="50000"/>
-                    <a:lumOff val="50000"/>
-                  </a:schemeClr>
-                </a:solidFill>
-              </a:rPr>
-              <a:t>interface.py</a:t>
-            </a:r>
-            <a:endParaRPr lang="LID4096" sz="1400" dirty="0">
-              <a:solidFill>
-                <a:schemeClr val="tx1">
-                  <a:lumMod val="50000"/>
-                  <a:lumOff val="50000"/>
-                </a:schemeClr>
-              </a:solidFill>
-            </a:endParaRPr>
-          </a:p>
-        </p:txBody>
-      </p:sp>
-      <p:sp>
-        <p:nvSpPr>
-          <p:cNvPr id="168" name="Rectangle 167">
-            <a:extLst>
-              <a:ext uri="{FF2B5EF4-FFF2-40B4-BE49-F238E27FC236}">
-                <a16:creationId xmlns:a16="http://schemas.microsoft.com/office/drawing/2014/main" id="{C7C53D94-9529-4330-981D-12E0AFC6ECB1}"/>
-              </a:ext>
-            </a:extLst>
-          </p:cNvPr>
-          <p:cNvSpPr/>
-          <p:nvPr/>
-        </p:nvSpPr>
-        <p:spPr>
-          <a:xfrm>
-            <a:off x="9936337" y="2979718"/>
-            <a:ext cx="1279741" cy="605307"/>
-          </a:xfrm>
-          <a:prstGeom prst="rect">
-            <a:avLst/>
-          </a:prstGeom>
-          <a:solidFill>
-            <a:schemeClr val="accent1">
-              <a:lumMod val="20000"/>
-              <a:lumOff val="80000"/>
-            </a:schemeClr>
-          </a:solidFill>
-        </p:spPr>
-        <p:style>
-          <a:lnRef idx="2">
-            <a:schemeClr val="accent1">
-              <a:shade val="50000"/>
-            </a:schemeClr>
-          </a:lnRef>
-          <a:fillRef idx="1">
-            <a:schemeClr val="accent1"/>
-          </a:fillRef>
-          <a:effectRef idx="0">
-            <a:schemeClr val="accent1"/>
-          </a:effectRef>
-          <a:fontRef idx="minor">
-            <a:schemeClr val="lt1"/>
-          </a:fontRef>
-        </p:style>
-        <p:txBody>
-          <a:bodyPr rot="0" spcFirstLastPara="0" vertOverflow="overflow" horzOverflow="overflow" vert="horz" wrap="square" lIns="91440" tIns="45720" rIns="91440" bIns="45720" numCol="1" spcCol="0" rtlCol="0" fromWordArt="0" anchor="ctr" anchorCtr="0" forceAA="0" compatLnSpc="1">
-            <a:prstTxWarp prst="textNoShape">
-              <a:avLst/>
-            </a:prstTxWarp>
-            <a:noAutofit/>
-          </a:bodyPr>
-          <a:lstStyle/>
-          <a:p>
-            <a:pPr algn="ctr"/>
-            <a:r>
-              <a:rPr lang="en-US" sz="1400" dirty="0">
-                <a:solidFill>
-                  <a:schemeClr val="tx1">
-                    <a:lumMod val="50000"/>
-                    <a:lumOff val="50000"/>
-                  </a:schemeClr>
-                </a:solidFill>
-              </a:rPr>
-              <a:t>brewfather.py</a:t>
-            </a:r>
-            <a:endParaRPr lang="LID4096" sz="1400" dirty="0">
-              <a:solidFill>
-                <a:schemeClr val="tx1">
-                  <a:lumMod val="50000"/>
-                  <a:lumOff val="50000"/>
-                </a:schemeClr>
-              </a:solidFill>
-            </a:endParaRPr>
-          </a:p>
-        </p:txBody>
-      </p:sp>
-      <p:sp>
-        <p:nvSpPr>
-          <p:cNvPr id="169" name="Rectangle 168">
-            <a:extLst>
-              <a:ext uri="{FF2B5EF4-FFF2-40B4-BE49-F238E27FC236}">
-                <a16:creationId xmlns:a16="http://schemas.microsoft.com/office/drawing/2014/main" id="{A07D47E8-DCA1-4EEB-9897-627C340B5C26}"/>
-              </a:ext>
-            </a:extLst>
-          </p:cNvPr>
-          <p:cNvSpPr/>
-          <p:nvPr/>
-        </p:nvSpPr>
-        <p:spPr>
-          <a:xfrm>
-            <a:off x="9930081" y="1925795"/>
+            <a:off x="9933209" y="1925795"/>
             <a:ext cx="1279741" cy="605307"/>
           </a:xfrm>
           <a:prstGeom prst="rect">
@@ -5862,54 +5166,6 @@
       </p:sp>
       <p:cxnSp>
         <p:nvCxnSpPr>
-          <p:cNvPr id="170" name="Connector: Elbow 169">
-            <a:extLst>
-              <a:ext uri="{FF2B5EF4-FFF2-40B4-BE49-F238E27FC236}">
-                <a16:creationId xmlns:a16="http://schemas.microsoft.com/office/drawing/2014/main" id="{00BE382D-27EF-4DE7-A14D-55B78398785E}"/>
-              </a:ext>
-            </a:extLst>
-          </p:cNvPr>
-          <p:cNvCxnSpPr>
-            <a:cxnSpLocks/>
-            <a:stCxn id="4" idx="2"/>
-            <a:endCxn id="7" idx="2"/>
-          </p:cNvCxnSpPr>
-          <p:nvPr/>
-        </p:nvCxnSpPr>
-        <p:spPr>
-          <a:xfrm rot="5400000" flipH="1">
-            <a:off x="1918593" y="3075391"/>
-            <a:ext cx="388212" cy="1229"/>
-          </a:xfrm>
-          <a:prstGeom prst="bentConnector3">
-            <a:avLst>
-              <a:gd name="adj1" fmla="val -58885"/>
-            </a:avLst>
-          </a:prstGeom>
-          <a:ln w="12700">
-            <a:solidFill>
-              <a:schemeClr val="tx1"/>
-            </a:solidFill>
-            <a:prstDash val="dash"/>
-          </a:ln>
-        </p:spPr>
-        <p:style>
-          <a:lnRef idx="1">
-            <a:schemeClr val="accent1"/>
-          </a:lnRef>
-          <a:fillRef idx="0">
-            <a:schemeClr val="accent1"/>
-          </a:fillRef>
-          <a:effectRef idx="0">
-            <a:schemeClr val="accent1"/>
-          </a:effectRef>
-          <a:fontRef idx="minor">
-            <a:schemeClr val="tx1"/>
-          </a:fontRef>
-        </p:style>
-      </p:cxnSp>
-      <p:cxnSp>
-        <p:nvCxnSpPr>
           <p:cNvPr id="177" name="Connector: Elbow 176">
             <a:extLst>
               <a:ext uri="{FF2B5EF4-FFF2-40B4-BE49-F238E27FC236}">
@@ -5926,12 +5182,12 @@
         </p:nvCxnSpPr>
         <p:spPr>
           <a:xfrm rot="5400000">
-            <a:off x="9513830" y="1923596"/>
-            <a:ext cx="448616" cy="1663629"/>
+            <a:off x="9515394" y="1922032"/>
+            <a:ext cx="448616" cy="1666757"/>
           </a:xfrm>
           <a:prstGeom prst="bentConnector3">
             <a:avLst>
-              <a:gd name="adj1" fmla="val 67225"/>
+              <a:gd name="adj1" fmla="val 50000"/>
             </a:avLst>
           </a:prstGeom>
           <a:ln>
@@ -5970,9 +5226,9 @@
           <p:nvPr/>
         </p:nvCxnSpPr>
         <p:spPr>
-          <a:xfrm rot="16200000" flipH="1">
-            <a:off x="10348772" y="2752282"/>
-            <a:ext cx="448616" cy="6256"/>
+          <a:xfrm rot="5400000">
+            <a:off x="10348772" y="2755410"/>
+            <a:ext cx="448616" cy="12700"/>
           </a:xfrm>
           <a:prstGeom prst="bentConnector3">
             <a:avLst>
@@ -6016,12 +5272,12 @@
         </p:nvCxnSpPr>
         <p:spPr>
           <a:xfrm rot="5400000">
-            <a:off x="9738137" y="1699287"/>
-            <a:ext cx="12700" cy="1663630"/>
+            <a:off x="9739701" y="1697723"/>
+            <a:ext cx="12700" cy="1666758"/>
           </a:xfrm>
           <a:prstGeom prst="bentConnector3">
             <a:avLst>
-              <a:gd name="adj1" fmla="val 1191543"/>
+              <a:gd name="adj1" fmla="val 1736843"/>
             </a:avLst>
           </a:prstGeom>
           <a:ln>
@@ -6061,57 +5317,14 @@
         </p:nvCxnSpPr>
         <p:spPr>
           <a:xfrm rot="5400000" flipH="1">
-            <a:off x="9072290" y="1033440"/>
-            <a:ext cx="301678" cy="2693646"/>
+            <a:off x="9073854" y="1031876"/>
+            <a:ext cx="301678" cy="2696774"/>
           </a:xfrm>
           <a:prstGeom prst="bentConnector4">
             <a:avLst>
-              <a:gd name="adj1" fmla="val -73641"/>
-              <a:gd name="adj2" fmla="val 88891"/>
+              <a:gd name="adj1" fmla="val -73117"/>
+              <a:gd name="adj2" fmla="val 88930"/>
             </a:avLst>
-          </a:prstGeom>
-          <a:ln>
-            <a:tailEnd type="triangle"/>
-          </a:ln>
-        </p:spPr>
-        <p:style>
-          <a:lnRef idx="1">
-            <a:schemeClr val="accent1"/>
-          </a:lnRef>
-          <a:fillRef idx="0">
-            <a:schemeClr val="accent1"/>
-          </a:fillRef>
-          <a:effectRef idx="0">
-            <a:schemeClr val="accent1"/>
-          </a:effectRef>
-          <a:fontRef idx="minor">
-            <a:schemeClr val="tx1"/>
-          </a:fontRef>
-        </p:style>
-      </p:cxnSp>
-      <p:cxnSp>
-        <p:nvCxnSpPr>
-          <p:cNvPr id="193" name="Straight Arrow Connector 192">
-            <a:extLst>
-              <a:ext uri="{FF2B5EF4-FFF2-40B4-BE49-F238E27FC236}">
-                <a16:creationId xmlns:a16="http://schemas.microsoft.com/office/drawing/2014/main" id="{BEF022BD-7390-4020-A33B-310EBA0B8DD2}"/>
-              </a:ext>
-            </a:extLst>
-          </p:cNvPr>
-          <p:cNvCxnSpPr>
-            <a:cxnSpLocks/>
-            <a:stCxn id="159" idx="1"/>
-            <a:endCxn id="135" idx="3"/>
-          </p:cNvCxnSpPr>
-          <p:nvPr/>
-        </p:nvCxnSpPr>
-        <p:spPr>
-          <a:xfrm flipH="1">
-            <a:off x="7876307" y="3282372"/>
-            <a:ext cx="390145" cy="0"/>
-          </a:xfrm>
-          <a:prstGeom prst="straightConnector1">
-            <a:avLst/>
           </a:prstGeom>
           <a:ln>
             <a:tailEnd type="triangle"/>
@@ -6792,42 +6005,102 @@
           </a:p>
         </p:txBody>
       </p:sp>
-    </p:spTree>
-    <p:extLst>
-      <p:ext uri="{BB962C8B-B14F-4D97-AF65-F5344CB8AC3E}">
-        <p14:creationId xmlns:p14="http://schemas.microsoft.com/office/powerpoint/2010/main" val="2258853100"/>
-      </p:ext>
-    </p:extLst>
-  </p:cSld>
-  <p:clrMapOvr>
-    <a:masterClrMapping/>
-  </p:clrMapOvr>
-</p:sld>
-</file>
-
-<file path=ppt/slides/slide2.xml><?xml version="1.0" encoding="utf-8"?>
-<p:sld xmlns:a="http://schemas.openxmlformats.org/drawingml/2006/main" xmlns:r="http://schemas.openxmlformats.org/officeDocument/2006/relationships" xmlns:p="http://schemas.openxmlformats.org/presentationml/2006/main">
-  <p:cSld>
-    <p:spTree>
-      <p:nvGrpSpPr>
-        <p:cNvPr id="1" name=""/>
-        <p:cNvGrpSpPr/>
-        <p:nvPr/>
-      </p:nvGrpSpPr>
-      <p:grpSpPr>
-        <a:xfrm>
-          <a:off x="0" y="0"/>
-          <a:ext cx="0" cy="0"/>
-          <a:chOff x="0" y="0"/>
-          <a:chExt cx="0" cy="0"/>
-        </a:xfrm>
-      </p:grpSpPr>
-      <p:sp>
-        <p:nvSpPr>
-          <p:cNvPr id="4" name="Rectangle: Folded Corner 3">
-            <a:extLst>
-              <a:ext uri="{FF2B5EF4-FFF2-40B4-BE49-F238E27FC236}">
-                <a16:creationId xmlns:a16="http://schemas.microsoft.com/office/drawing/2014/main" id="{8AB468BC-DABA-4363-86ED-08D000A35CEA}"/>
+      <p:cxnSp>
+        <p:nvCxnSpPr>
+          <p:cNvPr id="27" name="Connector: Elbow 26">
+            <a:extLst>
+              <a:ext uri="{FF2B5EF4-FFF2-40B4-BE49-F238E27FC236}">
+                <a16:creationId xmlns:a16="http://schemas.microsoft.com/office/drawing/2014/main" id="{F4713DB6-5A45-4D08-A7A1-1F72AAF973B9}"/>
+              </a:ext>
+            </a:extLst>
+          </p:cNvPr>
+          <p:cNvCxnSpPr>
+            <a:stCxn id="5" idx="1"/>
+            <a:endCxn id="159" idx="2"/>
+          </p:cNvCxnSpPr>
+          <p:nvPr/>
+        </p:nvCxnSpPr>
+        <p:spPr>
+          <a:xfrm rot="10800000" flipH="1" flipV="1">
+            <a:off x="6088871" y="2604495"/>
+            <a:ext cx="2817451" cy="980529"/>
+          </a:xfrm>
+          <a:prstGeom prst="bentConnector4">
+            <a:avLst>
+              <a:gd name="adj1" fmla="val 17224"/>
+              <a:gd name="adj2" fmla="val 109203"/>
+            </a:avLst>
+          </a:prstGeom>
+          <a:ln w="12700">
+            <a:solidFill>
+              <a:schemeClr val="tx1"/>
+            </a:solidFill>
+            <a:prstDash val="lgDash"/>
+          </a:ln>
+        </p:spPr>
+        <p:style>
+          <a:lnRef idx="1">
+            <a:schemeClr val="accent1"/>
+          </a:lnRef>
+          <a:fillRef idx="0">
+            <a:schemeClr val="accent1"/>
+          </a:fillRef>
+          <a:effectRef idx="0">
+            <a:schemeClr val="accent1"/>
+          </a:effectRef>
+          <a:fontRef idx="minor">
+            <a:schemeClr val="tx1"/>
+          </a:fontRef>
+        </p:style>
+      </p:cxnSp>
+      <p:sp>
+        <p:nvSpPr>
+          <p:cNvPr id="84" name="TextBox 83">
+            <a:extLst>
+              <a:ext uri="{FF2B5EF4-FFF2-40B4-BE49-F238E27FC236}">
+                <a16:creationId xmlns:a16="http://schemas.microsoft.com/office/drawing/2014/main" id="{2F46F427-BCA2-44E5-A0E0-7DE670E974CF}"/>
+              </a:ext>
+            </a:extLst>
+          </p:cNvPr>
+          <p:cNvSpPr txBox="1"/>
+          <p:nvPr/>
+        </p:nvSpPr>
+        <p:spPr>
+          <a:xfrm>
+            <a:off x="6135627" y="3286759"/>
+            <a:ext cx="2213367" cy="253916"/>
+          </a:xfrm>
+          <a:prstGeom prst="rect">
+            <a:avLst/>
+          </a:prstGeom>
+          <a:solidFill>
+            <a:srgbClr val="B4C7E7"/>
+          </a:solidFill>
+        </p:spPr>
+        <p:txBody>
+          <a:bodyPr wrap="square">
+            <a:spAutoFit/>
+          </a:bodyPr>
+          <a:lstStyle/>
+          <a:p>
+            <a:r>
+              <a:rPr lang="LID4096" sz="1050" dirty="0"/>
+              <a:t>/sys/bus/w1/devices/</a:t>
+            </a:r>
+            <a:r>
+              <a:rPr lang="en-US" sz="1050" dirty="0"/>
+              <a:t>&lt;id&gt;/w1_slave</a:t>
+            </a:r>
+            <a:endParaRPr lang="LID4096" sz="1050" dirty="0"/>
+          </a:p>
+        </p:txBody>
+      </p:sp>
+      <p:sp>
+        <p:nvSpPr>
+          <p:cNvPr id="159" name="Rectangle 158">
+            <a:extLst>
+              <a:ext uri="{FF2B5EF4-FFF2-40B4-BE49-F238E27FC236}">
+                <a16:creationId xmlns:a16="http://schemas.microsoft.com/office/drawing/2014/main" id="{ADFBC12F-91C4-492B-9377-E0EFFBFA7AFA}"/>
               </a:ext>
             </a:extLst>
           </p:cNvPr>
@@ -6836,13 +6109,18 @@
         </p:nvSpPr>
         <p:spPr>
           <a:xfrm>
-            <a:off x="1122074" y="1152232"/>
-            <a:ext cx="3958642" cy="4359926"/>
-          </a:xfrm>
-          <a:prstGeom prst="foldedCorner">
+            <a:off x="8266452" y="2979718"/>
+            <a:ext cx="1279741" cy="605307"/>
+          </a:xfrm>
+          <a:prstGeom prst="rect">
             <a:avLst/>
           </a:prstGeom>
-          <a:noFill/>
+          <a:solidFill>
+            <a:schemeClr val="accent1">
+              <a:lumMod val="20000"/>
+              <a:lumOff val="80000"/>
+            </a:schemeClr>
+          </a:solidFill>
         </p:spPr>
         <p:style>
           <a:lnRef idx="2">
@@ -6861,17 +6139,31 @@
           </a:fontRef>
         </p:style>
         <p:txBody>
-          <a:bodyPr rtlCol="0" anchor="ctr"/>
-          <a:lstStyle/>
-          <a:p>
-            <a:pPr marL="285750" indent="-285750">
-              <a:buFont typeface="Arial" panose="020B0604020202020204" pitchFamily="34" charset="0"/>
-              <a:buChar char="•"/>
-            </a:pPr>
-            <a:endParaRPr lang="LID4096" sz="1600" dirty="0">
+          <a:bodyPr rot="0" spcFirstLastPara="0" vertOverflow="overflow" horzOverflow="overflow" vert="horz" wrap="square" lIns="91440" tIns="45720" rIns="91440" bIns="45720" numCol="1" spcCol="0" rtlCol="0" fromWordArt="0" anchor="ctr" anchorCtr="0" forceAA="0" compatLnSpc="1">
+            <a:prstTxWarp prst="textNoShape">
+              <a:avLst/>
+            </a:prstTxWarp>
+            <a:noAutofit/>
+          </a:bodyPr>
+          <a:lstStyle/>
+          <a:p>
+            <a:pPr algn="ctr"/>
+            <a:r>
+              <a:rPr lang="en-US" sz="1400" dirty="0">
+                <a:solidFill>
+                  <a:schemeClr val="tx1">
+                    <a:lumMod val="50000"/>
+                    <a:lumOff val="50000"/>
+                  </a:schemeClr>
+                </a:solidFill>
+              </a:rPr>
+              <a:t>chamber.py</a:t>
+            </a:r>
+            <a:endParaRPr lang="LID4096" sz="1400" dirty="0">
               <a:solidFill>
-                <a:schemeClr val="bg1">
+                <a:schemeClr val="tx1">
                   <a:lumMod val="50000"/>
+                  <a:lumOff val="50000"/>
                 </a:schemeClr>
               </a:solidFill>
             </a:endParaRPr>
@@ -6880,10 +6172,10 @@
       </p:sp>
       <p:sp>
         <p:nvSpPr>
-          <p:cNvPr id="6" name="Rectangle 5">
-            <a:extLst>
-              <a:ext uri="{FF2B5EF4-FFF2-40B4-BE49-F238E27FC236}">
-                <a16:creationId xmlns:a16="http://schemas.microsoft.com/office/drawing/2014/main" id="{4292E592-17F5-40AC-965E-4BDE529042DE}"/>
+          <p:cNvPr id="230" name="Rectangle: Folded Corner 229">
+            <a:extLst>
+              <a:ext uri="{FF2B5EF4-FFF2-40B4-BE49-F238E27FC236}">
+                <a16:creationId xmlns:a16="http://schemas.microsoft.com/office/drawing/2014/main" id="{3074E148-E56A-40A3-A338-25C3A5D709BA}"/>
               </a:ext>
             </a:extLst>
           </p:cNvPr>
@@ -6892,288 +6184,18 @@
         </p:nvSpPr>
         <p:spPr>
           <a:xfrm>
-            <a:off x="1286414" y="1759854"/>
-            <a:ext cx="3629963" cy="1477328"/>
-          </a:xfrm>
-          <a:prstGeom prst="rect">
+            <a:off x="7388897" y="2446885"/>
+            <a:ext cx="437934" cy="440838"/>
+          </a:xfrm>
+          <a:prstGeom prst="foldedCorner">
             <a:avLst/>
           </a:prstGeom>
-          <a:ln>
-            <a:solidFill>
-              <a:srgbClr val="0070C0"/>
-            </a:solidFill>
-          </a:ln>
-        </p:spPr>
-        <p:txBody>
-          <a:bodyPr wrap="square">
-            <a:spAutoFit/>
-          </a:bodyPr>
-          <a:lstStyle/>
-          <a:p>
-            <a:r>
-              <a:rPr lang="en-US" dirty="0">
-                <a:solidFill>
-                  <a:schemeClr val="bg1">
-                    <a:lumMod val="50000"/>
-                  </a:schemeClr>
-                </a:solidFill>
-              </a:rPr>
-              <a:t>Target Beer Temp		</a:t>
-            </a:r>
-            <a:r>
-              <a:rPr lang="en-US" dirty="0" err="1">
-                <a:solidFill>
-                  <a:schemeClr val="bg1">
-                    <a:lumMod val="50000"/>
-                  </a:schemeClr>
-                </a:solidFill>
-              </a:rPr>
-              <a:t>xx.x</a:t>
-            </a:r>
-            <a:r>
-              <a:rPr lang="en-US" dirty="0">
-                <a:solidFill>
-                  <a:schemeClr val="bg1">
-                    <a:lumMod val="50000"/>
-                  </a:schemeClr>
-                </a:solidFill>
-              </a:rPr>
-              <a:t> C</a:t>
-            </a:r>
-            <a:endParaRPr lang="en-US" dirty="0">
-              <a:solidFill>
-                <a:srgbClr val="0070C0"/>
-              </a:solidFill>
-            </a:endParaRPr>
-          </a:p>
-          <a:p>
-            <a:r>
-              <a:rPr lang="en-US" dirty="0">
-                <a:solidFill>
-                  <a:schemeClr val="bg1">
-                    <a:lumMod val="50000"/>
-                  </a:schemeClr>
-                </a:solidFill>
-              </a:rPr>
-              <a:t>Beer Temp		</a:t>
-            </a:r>
-            <a:r>
-              <a:rPr lang="en-US" dirty="0" err="1">
-                <a:solidFill>
-                  <a:schemeClr val="bg1">
-                    <a:lumMod val="50000"/>
-                  </a:schemeClr>
-                </a:solidFill>
-              </a:rPr>
-              <a:t>xx.x</a:t>
-            </a:r>
-            <a:r>
-              <a:rPr lang="en-US" dirty="0">
-                <a:solidFill>
-                  <a:schemeClr val="bg1">
-                    <a:lumMod val="50000"/>
-                  </a:schemeClr>
-                </a:solidFill>
-              </a:rPr>
-              <a:t> C</a:t>
-            </a:r>
-            <a:endParaRPr lang="en-US" dirty="0">
-              <a:solidFill>
-                <a:srgbClr val="0070C0"/>
-              </a:solidFill>
-            </a:endParaRPr>
-          </a:p>
-          <a:p>
-            <a:r>
-              <a:rPr lang="en-US" dirty="0">
-                <a:solidFill>
-                  <a:schemeClr val="bg1">
-                    <a:lumMod val="50000"/>
-                  </a:schemeClr>
-                </a:solidFill>
-              </a:rPr>
-              <a:t>Beer Temp (Wired)		</a:t>
-            </a:r>
-            <a:r>
-              <a:rPr lang="en-US" dirty="0" err="1">
-                <a:solidFill>
-                  <a:schemeClr val="bg1">
-                    <a:lumMod val="50000"/>
-                  </a:schemeClr>
-                </a:solidFill>
-              </a:rPr>
-              <a:t>xx.x</a:t>
-            </a:r>
-            <a:r>
-              <a:rPr lang="en-US" dirty="0">
-                <a:solidFill>
-                  <a:schemeClr val="bg1">
-                    <a:lumMod val="50000"/>
-                  </a:schemeClr>
-                </a:solidFill>
-              </a:rPr>
-              <a:t> C</a:t>
-            </a:r>
-          </a:p>
-          <a:p>
-            <a:r>
-              <a:rPr lang="en-US" dirty="0">
-                <a:solidFill>
-                  <a:schemeClr val="bg1">
-                    <a:lumMod val="50000"/>
-                  </a:schemeClr>
-                </a:solidFill>
-              </a:rPr>
-              <a:t>Chamber Temp (Wired)	</a:t>
-            </a:r>
-            <a:r>
-              <a:rPr lang="en-US" dirty="0" err="1">
-                <a:solidFill>
-                  <a:schemeClr val="bg1">
-                    <a:lumMod val="50000"/>
-                  </a:schemeClr>
-                </a:solidFill>
-              </a:rPr>
-              <a:t>xx.x</a:t>
-            </a:r>
-            <a:r>
-              <a:rPr lang="en-US" dirty="0">
-                <a:solidFill>
-                  <a:schemeClr val="bg1">
-                    <a:lumMod val="50000"/>
-                  </a:schemeClr>
-                </a:solidFill>
-              </a:rPr>
-              <a:t> C</a:t>
-            </a:r>
-            <a:endParaRPr lang="en-US" dirty="0">
-              <a:solidFill>
-                <a:srgbClr val="0070C0"/>
-              </a:solidFill>
-            </a:endParaRPr>
-          </a:p>
-          <a:p>
-            <a:r>
-              <a:rPr lang="en-US" dirty="0">
-                <a:solidFill>
-                  <a:schemeClr val="bg1">
-                    <a:lumMod val="50000"/>
-                  </a:schemeClr>
-                </a:solidFill>
-              </a:rPr>
-              <a:t>Specific Gravity (Tilt)	</a:t>
-            </a:r>
-            <a:r>
-              <a:rPr lang="en-US" dirty="0" err="1">
-                <a:solidFill>
-                  <a:schemeClr val="bg1">
-                    <a:lumMod val="50000"/>
-                  </a:schemeClr>
-                </a:solidFill>
-              </a:rPr>
-              <a:t>x.xxx</a:t>
-            </a:r>
-            <a:endParaRPr lang="en-US" dirty="0">
-              <a:solidFill>
-                <a:schemeClr val="bg1">
-                  <a:lumMod val="50000"/>
-                </a:schemeClr>
-              </a:solidFill>
-            </a:endParaRPr>
-          </a:p>
-        </p:txBody>
-      </p:sp>
-      <p:sp>
-        <p:nvSpPr>
-          <p:cNvPr id="7" name="TextBox 6">
-            <a:extLst>
-              <a:ext uri="{FF2B5EF4-FFF2-40B4-BE49-F238E27FC236}">
-                <a16:creationId xmlns:a16="http://schemas.microsoft.com/office/drawing/2014/main" id="{E5EDD518-36F1-42FA-AE99-27CF8F0163CB}"/>
-              </a:ext>
-            </a:extLst>
-          </p:cNvPr>
-          <p:cNvSpPr txBox="1"/>
-          <p:nvPr/>
-        </p:nvSpPr>
-        <p:spPr>
-          <a:xfrm>
-            <a:off x="1974292" y="3578717"/>
-            <a:ext cx="1593706" cy="923330"/>
-          </a:xfrm>
-          <a:prstGeom prst="rect">
-            <a:avLst/>
-          </a:prstGeom>
-          <a:noFill/>
-        </p:spPr>
-        <p:txBody>
-          <a:bodyPr wrap="none" rtlCol="0">
-            <a:spAutoFit/>
-          </a:bodyPr>
-          <a:lstStyle/>
-          <a:p>
-            <a:r>
-              <a:rPr lang="en-US" dirty="0">
-                <a:solidFill>
-                  <a:srgbClr val="0070C0"/>
-                </a:solidFill>
-              </a:rPr>
-              <a:t>Dates	……..</a:t>
-            </a:r>
-          </a:p>
-          <a:p>
-            <a:r>
-              <a:rPr lang="en-US" dirty="0">
-                <a:solidFill>
-                  <a:srgbClr val="0070C0"/>
-                </a:solidFill>
-              </a:rPr>
-              <a:t>Temps	……..</a:t>
-            </a:r>
-          </a:p>
-          <a:p>
-            <a:r>
-              <a:rPr lang="en-US" dirty="0">
-                <a:solidFill>
-                  <a:srgbClr val="0070C0"/>
-                </a:solidFill>
-              </a:rPr>
-              <a:t>End Date	……..</a:t>
-            </a:r>
-            <a:endParaRPr lang="LID4096" dirty="0">
-              <a:solidFill>
-                <a:srgbClr val="0070C0"/>
-              </a:solidFill>
-            </a:endParaRPr>
-          </a:p>
-        </p:txBody>
-      </p:sp>
-      <p:sp>
-        <p:nvSpPr>
-          <p:cNvPr id="8" name="Rectangle: Rounded Corners 7">
-            <a:extLst>
-              <a:ext uri="{FF2B5EF4-FFF2-40B4-BE49-F238E27FC236}">
-                <a16:creationId xmlns:a16="http://schemas.microsoft.com/office/drawing/2014/main" id="{39DCE124-563F-49DC-8EBE-AEDDB8A4EE97}"/>
-              </a:ext>
-            </a:extLst>
-          </p:cNvPr>
-          <p:cNvSpPr/>
-          <p:nvPr/>
-        </p:nvSpPr>
-        <p:spPr>
-          <a:xfrm>
-            <a:off x="2566922" y="4874146"/>
-            <a:ext cx="1068946" cy="553791"/>
-          </a:xfrm>
-          <a:prstGeom prst="roundRect">
-            <a:avLst/>
-          </a:prstGeom>
-          <a:scene3d>
-            <a:camera prst="orthographicFront"/>
-            <a:lightRig rig="threePt" dir="t"/>
-          </a:scene3d>
-          <a:sp3d>
-            <a:bevelT/>
-          </a:sp3d>
+          <a:solidFill>
+            <a:schemeClr val="accent4">
+              <a:lumMod val="40000"/>
+              <a:lumOff val="60000"/>
+            </a:schemeClr>
+          </a:solidFill>
         </p:spPr>
         <p:style>
           <a:lnRef idx="2">
@@ -7197,53 +6219,217 @@
           <a:p>
             <a:pPr algn="ctr"/>
             <a:r>
-              <a:rPr lang="en-US" dirty="0"/>
-              <a:t>Submit</a:t>
-            </a:r>
-            <a:endParaRPr lang="LID4096" dirty="0"/>
-          </a:p>
-        </p:txBody>
-      </p:sp>
-      <p:sp>
-        <p:nvSpPr>
-          <p:cNvPr id="9" name="TextBox 8">
-            <a:extLst>
-              <a:ext uri="{FF2B5EF4-FFF2-40B4-BE49-F238E27FC236}">
-                <a16:creationId xmlns:a16="http://schemas.microsoft.com/office/drawing/2014/main" id="{35A9228F-BB55-4905-95A5-FDB2A3CC6D76}"/>
-              </a:ext>
-            </a:extLst>
-          </p:cNvPr>
-          <p:cNvSpPr txBox="1"/>
+              <a:rPr lang="en-US" sz="1050" dirty="0">
+                <a:solidFill>
+                  <a:schemeClr val="tx1"/>
+                </a:solidFill>
+              </a:rPr>
+              <a:t>.ini</a:t>
+            </a:r>
+            <a:endParaRPr lang="LID4096" sz="1050" dirty="0">
+              <a:solidFill>
+                <a:schemeClr val="tx1"/>
+              </a:solidFill>
+            </a:endParaRPr>
+          </a:p>
+        </p:txBody>
+      </p:sp>
+      <p:sp>
+        <p:nvSpPr>
+          <p:cNvPr id="91" name="Rectangle: Folded Corner 90">
+            <a:extLst>
+              <a:ext uri="{FF2B5EF4-FFF2-40B4-BE49-F238E27FC236}">
+                <a16:creationId xmlns:a16="http://schemas.microsoft.com/office/drawing/2014/main" id="{97D9BED4-0DDB-4966-9963-1F0F408CDAF9}"/>
+              </a:ext>
+            </a:extLst>
+          </p:cNvPr>
+          <p:cNvSpPr/>
           <p:nvPr/>
         </p:nvSpPr>
         <p:spPr>
           <a:xfrm>
-            <a:off x="2279920" y="1218069"/>
-            <a:ext cx="1642950" cy="400110"/>
-          </a:xfrm>
-          <a:prstGeom prst="rect">
+            <a:off x="11064768" y="2336651"/>
+            <a:ext cx="437934" cy="440838"/>
+          </a:xfrm>
+          <a:prstGeom prst="foldedCorner">
             <a:avLst/>
           </a:prstGeom>
-          <a:noFill/>
-        </p:spPr>
-        <p:txBody>
-          <a:bodyPr wrap="none" rtlCol="0">
-            <a:spAutoFit/>
-          </a:bodyPr>
-          <a:lstStyle/>
-          <a:p>
-            <a:r>
-              <a:rPr lang="en-US" sz="2000" b="1" dirty="0"/>
-              <a:t>FERMONITOR</a:t>
-            </a:r>
-            <a:endParaRPr lang="LID4096" sz="2000" b="1" dirty="0"/>
+          <a:solidFill>
+            <a:schemeClr val="accent4">
+              <a:lumMod val="40000"/>
+              <a:lumOff val="60000"/>
+            </a:schemeClr>
+          </a:solidFill>
+        </p:spPr>
+        <p:style>
+          <a:lnRef idx="2">
+            <a:schemeClr val="accent1">
+              <a:shade val="50000"/>
+            </a:schemeClr>
+          </a:lnRef>
+          <a:fillRef idx="1">
+            <a:schemeClr val="accent1"/>
+          </a:fillRef>
+          <a:effectRef idx="0">
+            <a:schemeClr val="accent1"/>
+          </a:effectRef>
+          <a:fontRef idx="minor">
+            <a:schemeClr val="lt1"/>
+          </a:fontRef>
+        </p:style>
+        <p:txBody>
+          <a:bodyPr rtlCol="0" anchor="ctr"/>
+          <a:lstStyle/>
+          <a:p>
+            <a:pPr algn="ctr"/>
+            <a:r>
+              <a:rPr lang="en-US" sz="1050" dirty="0">
+                <a:solidFill>
+                  <a:schemeClr val="tx1"/>
+                </a:solidFill>
+              </a:rPr>
+              <a:t>.ini</a:t>
+            </a:r>
+            <a:endParaRPr lang="LID4096" sz="1050" dirty="0">
+              <a:solidFill>
+                <a:schemeClr val="tx1"/>
+              </a:solidFill>
+            </a:endParaRPr>
+          </a:p>
+        </p:txBody>
+      </p:sp>
+      <p:sp>
+        <p:nvSpPr>
+          <p:cNvPr id="92" name="Rectangle: Folded Corner 91">
+            <a:extLst>
+              <a:ext uri="{FF2B5EF4-FFF2-40B4-BE49-F238E27FC236}">
+                <a16:creationId xmlns:a16="http://schemas.microsoft.com/office/drawing/2014/main" id="{66DCE354-9F2A-4BEB-A9D3-48361C25021B}"/>
+              </a:ext>
+            </a:extLst>
+          </p:cNvPr>
+          <p:cNvSpPr/>
+          <p:nvPr/>
+        </p:nvSpPr>
+        <p:spPr>
+          <a:xfrm>
+            <a:off x="11081022" y="3354942"/>
+            <a:ext cx="437934" cy="440838"/>
+          </a:xfrm>
+          <a:prstGeom prst="foldedCorner">
+            <a:avLst/>
+          </a:prstGeom>
+          <a:solidFill>
+            <a:schemeClr val="accent4">
+              <a:lumMod val="40000"/>
+              <a:lumOff val="60000"/>
+            </a:schemeClr>
+          </a:solidFill>
+        </p:spPr>
+        <p:style>
+          <a:lnRef idx="2">
+            <a:schemeClr val="accent1">
+              <a:shade val="50000"/>
+            </a:schemeClr>
+          </a:lnRef>
+          <a:fillRef idx="1">
+            <a:schemeClr val="accent1"/>
+          </a:fillRef>
+          <a:effectRef idx="0">
+            <a:schemeClr val="accent1"/>
+          </a:effectRef>
+          <a:fontRef idx="minor">
+            <a:schemeClr val="lt1"/>
+          </a:fontRef>
+        </p:style>
+        <p:txBody>
+          <a:bodyPr rtlCol="0" anchor="ctr"/>
+          <a:lstStyle/>
+          <a:p>
+            <a:pPr algn="ctr"/>
+            <a:r>
+              <a:rPr lang="en-US" sz="1050" dirty="0">
+                <a:solidFill>
+                  <a:schemeClr val="tx1"/>
+                </a:solidFill>
+              </a:rPr>
+              <a:t>.ini</a:t>
+            </a:r>
+            <a:endParaRPr lang="LID4096" sz="1050" dirty="0">
+              <a:solidFill>
+                <a:schemeClr val="tx1"/>
+              </a:solidFill>
+            </a:endParaRPr>
+          </a:p>
+        </p:txBody>
+      </p:sp>
+      <p:sp>
+        <p:nvSpPr>
+          <p:cNvPr id="93" name="Rectangle: Folded Corner 92">
+            <a:extLst>
+              <a:ext uri="{FF2B5EF4-FFF2-40B4-BE49-F238E27FC236}">
+                <a16:creationId xmlns:a16="http://schemas.microsoft.com/office/drawing/2014/main" id="{C2E7257E-E596-445E-94D6-673A3C06994D}"/>
+              </a:ext>
+            </a:extLst>
+          </p:cNvPr>
+          <p:cNvSpPr/>
+          <p:nvPr/>
+        </p:nvSpPr>
+        <p:spPr>
+          <a:xfrm>
+            <a:off x="9347138" y="3354942"/>
+            <a:ext cx="437934" cy="440838"/>
+          </a:xfrm>
+          <a:prstGeom prst="foldedCorner">
+            <a:avLst/>
+          </a:prstGeom>
+          <a:solidFill>
+            <a:schemeClr val="accent4">
+              <a:lumMod val="40000"/>
+              <a:lumOff val="60000"/>
+            </a:schemeClr>
+          </a:solidFill>
+        </p:spPr>
+        <p:style>
+          <a:lnRef idx="2">
+            <a:schemeClr val="accent1">
+              <a:shade val="50000"/>
+            </a:schemeClr>
+          </a:lnRef>
+          <a:fillRef idx="1">
+            <a:schemeClr val="accent1"/>
+          </a:fillRef>
+          <a:effectRef idx="0">
+            <a:schemeClr val="accent1"/>
+          </a:effectRef>
+          <a:fontRef idx="minor">
+            <a:schemeClr val="lt1"/>
+          </a:fontRef>
+        </p:style>
+        <p:txBody>
+          <a:bodyPr rtlCol="0" anchor="ctr"/>
+          <a:lstStyle/>
+          <a:p>
+            <a:pPr algn="ctr"/>
+            <a:r>
+              <a:rPr lang="en-US" sz="1050" dirty="0">
+                <a:solidFill>
+                  <a:schemeClr val="tx1"/>
+                </a:solidFill>
+              </a:rPr>
+              <a:t>.ini</a:t>
+            </a:r>
+            <a:endParaRPr lang="LID4096" sz="1050" dirty="0">
+              <a:solidFill>
+                <a:schemeClr val="tx1"/>
+              </a:solidFill>
+            </a:endParaRPr>
           </a:p>
         </p:txBody>
       </p:sp>
     </p:spTree>
     <p:extLst>
       <p:ext uri="{BB962C8B-B14F-4D97-AF65-F5344CB8AC3E}">
-        <p14:creationId xmlns:p14="http://schemas.microsoft.com/office/powerpoint/2010/main" val="1805238453"/>
+        <p14:creationId xmlns:p14="http://schemas.microsoft.com/office/powerpoint/2010/main" val="2258853100"/>
       </p:ext>
     </p:extLst>
   </p:cSld>

</xml_diff>